<commit_message>
Added worked examples and typo fixes
</commit_message>
<xml_diff>
--- a/Lecture Slides/VideoLectureSlides/5.4.pptx
+++ b/Lecture Slides/VideoLectureSlides/5.4.pptx
@@ -5,7 +5,7 @@
     <p:sldMasterId id="2147483660" r:id="rId4"/>
   </p:sldMasterIdLst>
   <p:notesMasterIdLst>
-    <p:notesMasterId r:id="rId17"/>
+    <p:notesMasterId r:id="rId19"/>
   </p:notesMasterIdLst>
   <p:sldIdLst>
     <p:sldId id="256" r:id="rId5"/>
@@ -19,7 +19,9 @@
     <p:sldId id="287" r:id="rId13"/>
     <p:sldId id="299" r:id="rId14"/>
     <p:sldId id="300" r:id="rId15"/>
-    <p:sldId id="302" r:id="rId16"/>
+    <p:sldId id="303" r:id="rId16"/>
+    <p:sldId id="302" r:id="rId17"/>
+    <p:sldId id="304" r:id="rId18"/>
   </p:sldIdLst>
   <p:sldSz cx="9144000" cy="6858000" type="screen4x3"/>
   <p:notesSz cx="6858000" cy="9144000"/>
@@ -161,6 +163,45 @@
 
 <file path=ppt/changesInfos/changesInfo1.xml><?xml version="1.0" encoding="utf-8"?>
 <pc:chgInfo xmlns:a="http://schemas.openxmlformats.org/drawingml/2006/main" xmlns:r="http://schemas.openxmlformats.org/officeDocument/2006/relationships" xmlns:ac="http://schemas.microsoft.com/office/drawing/2013/main/command" xmlns:pc="http://schemas.microsoft.com/office/powerpoint/2013/main/command">
+  <pc:docChgLst>
+    <pc:chgData name="Moore, Jacob Preston" userId="fdd3fd0f-c483-48c9-988d-7deb216763fd" providerId="ADAL" clId="{C7AD8A3F-1A0A-4161-BD4C-9F85CDF43D0B}"/>
+    <pc:docChg chg="modSld">
+      <pc:chgData name="Moore, Jacob Preston" userId="fdd3fd0f-c483-48c9-988d-7deb216763fd" providerId="ADAL" clId="{C7AD8A3F-1A0A-4161-BD4C-9F85CDF43D0B}" dt="2020-10-22T20:10:02.227" v="1" actId="20577"/>
+      <pc:docMkLst>
+        <pc:docMk/>
+      </pc:docMkLst>
+      <pc:sldChg chg="modSp">
+        <pc:chgData name="Moore, Jacob Preston" userId="fdd3fd0f-c483-48c9-988d-7deb216763fd" providerId="ADAL" clId="{C7AD8A3F-1A0A-4161-BD4C-9F85CDF43D0B}" dt="2020-10-22T20:09:23.594" v="0" actId="20577"/>
+        <pc:sldMkLst>
+          <pc:docMk/>
+          <pc:sldMk cId="1988669258" sldId="294"/>
+        </pc:sldMkLst>
+        <pc:spChg chg="mod">
+          <ac:chgData name="Moore, Jacob Preston" userId="fdd3fd0f-c483-48c9-988d-7deb216763fd" providerId="ADAL" clId="{C7AD8A3F-1A0A-4161-BD4C-9F85CDF43D0B}" dt="2020-10-22T20:09:23.594" v="0" actId="20577"/>
+          <ac:spMkLst>
+            <pc:docMk/>
+            <pc:sldMk cId="1988669258" sldId="294"/>
+            <ac:spMk id="3" creationId="{00000000-0000-0000-0000-000000000000}"/>
+          </ac:spMkLst>
+        </pc:spChg>
+      </pc:sldChg>
+      <pc:sldChg chg="modSp">
+        <pc:chgData name="Moore, Jacob Preston" userId="fdd3fd0f-c483-48c9-988d-7deb216763fd" providerId="ADAL" clId="{C7AD8A3F-1A0A-4161-BD4C-9F85CDF43D0B}" dt="2020-10-22T20:10:02.227" v="1" actId="20577"/>
+        <pc:sldMkLst>
+          <pc:docMk/>
+          <pc:sldMk cId="1751003400" sldId="295"/>
+        </pc:sldMkLst>
+        <pc:spChg chg="mod">
+          <ac:chgData name="Moore, Jacob Preston" userId="fdd3fd0f-c483-48c9-988d-7deb216763fd" providerId="ADAL" clId="{C7AD8A3F-1A0A-4161-BD4C-9F85CDF43D0B}" dt="2020-10-22T20:10:02.227" v="1" actId="20577"/>
+          <ac:spMkLst>
+            <pc:docMk/>
+            <pc:sldMk cId="1751003400" sldId="295"/>
+            <ac:spMk id="3" creationId="{00000000-0000-0000-0000-000000000000}"/>
+          </ac:spMkLst>
+        </pc:spChg>
+      </pc:sldChg>
+    </pc:docChg>
+  </pc:docChgLst>
   <pc:docChgLst>
     <pc:chgData name="Moore, Jacob Preston" userId="fdd3fd0f-c483-48c9-988d-7deb216763fd" providerId="ADAL" clId="{84DED168-40CF-461F-8BEA-8450112F5FB0}"/>
     <pc:docChg chg="custSel addSld delSld modSld sldOrd">
@@ -966,45 +1007,6 @@
       </pc:sldChg>
     </pc:docChg>
   </pc:docChgLst>
-  <pc:docChgLst>
-    <pc:chgData name="Moore, Jacob Preston" userId="fdd3fd0f-c483-48c9-988d-7deb216763fd" providerId="ADAL" clId="{C7AD8A3F-1A0A-4161-BD4C-9F85CDF43D0B}"/>
-    <pc:docChg chg="modSld">
-      <pc:chgData name="Moore, Jacob Preston" userId="fdd3fd0f-c483-48c9-988d-7deb216763fd" providerId="ADAL" clId="{C7AD8A3F-1A0A-4161-BD4C-9F85CDF43D0B}" dt="2020-10-22T20:10:02.227" v="1" actId="20577"/>
-      <pc:docMkLst>
-        <pc:docMk/>
-      </pc:docMkLst>
-      <pc:sldChg chg="modSp">
-        <pc:chgData name="Moore, Jacob Preston" userId="fdd3fd0f-c483-48c9-988d-7deb216763fd" providerId="ADAL" clId="{C7AD8A3F-1A0A-4161-BD4C-9F85CDF43D0B}" dt="2020-10-22T20:09:23.594" v="0" actId="20577"/>
-        <pc:sldMkLst>
-          <pc:docMk/>
-          <pc:sldMk cId="1988669258" sldId="294"/>
-        </pc:sldMkLst>
-        <pc:spChg chg="mod">
-          <ac:chgData name="Moore, Jacob Preston" userId="fdd3fd0f-c483-48c9-988d-7deb216763fd" providerId="ADAL" clId="{C7AD8A3F-1A0A-4161-BD4C-9F85CDF43D0B}" dt="2020-10-22T20:09:23.594" v="0" actId="20577"/>
-          <ac:spMkLst>
-            <pc:docMk/>
-            <pc:sldMk cId="1988669258" sldId="294"/>
-            <ac:spMk id="3" creationId="{00000000-0000-0000-0000-000000000000}"/>
-          </ac:spMkLst>
-        </pc:spChg>
-      </pc:sldChg>
-      <pc:sldChg chg="modSp">
-        <pc:chgData name="Moore, Jacob Preston" userId="fdd3fd0f-c483-48c9-988d-7deb216763fd" providerId="ADAL" clId="{C7AD8A3F-1A0A-4161-BD4C-9F85CDF43D0B}" dt="2020-10-22T20:10:02.227" v="1" actId="20577"/>
-        <pc:sldMkLst>
-          <pc:docMk/>
-          <pc:sldMk cId="1751003400" sldId="295"/>
-        </pc:sldMkLst>
-        <pc:spChg chg="mod">
-          <ac:chgData name="Moore, Jacob Preston" userId="fdd3fd0f-c483-48c9-988d-7deb216763fd" providerId="ADAL" clId="{C7AD8A3F-1A0A-4161-BD4C-9F85CDF43D0B}" dt="2020-10-22T20:10:02.227" v="1" actId="20577"/>
-          <ac:spMkLst>
-            <pc:docMk/>
-            <pc:sldMk cId="1751003400" sldId="295"/>
-            <ac:spMk id="3" creationId="{00000000-0000-0000-0000-000000000000}"/>
-          </ac:spMkLst>
-        </pc:spChg>
-      </pc:sldChg>
-    </pc:docChg>
-  </pc:docChgLst>
 </pc:chgInfo>
 </file>
 
@@ -1090,7 +1092,7 @@
           <a:p>
             <a:fld id="{1AA1AB63-216F-4D5B-8811-CCB935E98D4A}" type="datetimeFigureOut">
               <a:rPr lang="en-US" smtClean="0"/>
-              <a:t>10/22/2020</a:t>
+              <a:t>11/16/2021</a:t>
             </a:fld>
             <a:endParaRPr lang="en-US"/>
           </a:p>
@@ -1590,7 +1592,7 @@
           <a:p>
             <a:fld id="{198B1ED1-A6A8-44D7-9A75-7C99E7381227}" type="slidenum">
               <a:rPr lang="en-US" smtClean="0"/>
-              <a:t>12</a:t>
+              <a:t>13</a:t>
             </a:fld>
             <a:endParaRPr lang="en-US"/>
           </a:p>
@@ -5005,14 +5007,21 @@
             <p:ph idx="1"/>
           </p:nvPr>
         </p:nvSpPr>
-        <p:spPr/>
-        <p:txBody>
-          <a:bodyPr/>
+        <p:spPr>
+          <a:xfrm>
+            <a:off x="457200" y="1600201"/>
+            <a:ext cx="8229600" cy="1262332"/>
+          </a:xfrm>
+        </p:spPr>
+        <p:txBody>
+          <a:bodyPr>
+            <a:normAutofit fontScale="92500" lnSpcReduction="20000"/>
+          </a:bodyPr>
           <a:lstStyle/>
           <a:p>
             <a:r>
               <a:rPr lang="en-US" dirty="0"/>
-              <a:t>Find the force in each of the members.  Remember to specify tension or compression.</a:t>
+              <a:t>Use the method of joints to find the forces in all members of the truss shown below. Remember to specify tension or compression.</a:t>
             </a:r>
           </a:p>
         </p:txBody>
@@ -6577,7 +6586,7 @@
           <a:p>
             <a:r>
               <a:rPr lang="en-US" dirty="0"/>
-              <a:t>Method of Joints Practice Problem</a:t>
+              <a:t>Method of Joints Worked Example</a:t>
             </a:r>
           </a:p>
         </p:txBody>
@@ -6594,17 +6603,19 @@
         </p:nvSpPr>
         <p:spPr>
           <a:xfrm>
-            <a:off x="457200" y="1341437"/>
-            <a:ext cx="8229600" cy="4525963"/>
-          </a:xfrm>
-        </p:spPr>
-        <p:txBody>
-          <a:bodyPr/>
+            <a:off x="457200" y="1113882"/>
+            <a:ext cx="8229600" cy="1269064"/>
+          </a:xfrm>
+        </p:spPr>
+        <p:txBody>
+          <a:bodyPr>
+            <a:normAutofit fontScale="92500" lnSpcReduction="20000"/>
+          </a:bodyPr>
           <a:lstStyle/>
           <a:p>
             <a:r>
               <a:rPr lang="en-US" dirty="0"/>
-              <a:t>Solve for the forces in each member of this truss structure.</a:t>
+              <a:t>Use the method of joints to find the forces in all members of the truss shown below. Remember to specify tension or compression.</a:t>
             </a:r>
           </a:p>
         </p:txBody>
@@ -7740,6 +7751,1972 @@
       </p:grpSpPr>
       <p:sp>
         <p:nvSpPr>
+          <p:cNvPr id="59" name="Rounded Rectangle 3">
+            <a:extLst>
+              <a:ext uri="{FF2B5EF4-FFF2-40B4-BE49-F238E27FC236}">
+                <a16:creationId xmlns:a16="http://schemas.microsoft.com/office/drawing/2014/main" id="{57AFDB4D-89C0-4159-B6DD-1BE068D7CEC2}"/>
+              </a:ext>
+            </a:extLst>
+          </p:cNvPr>
+          <p:cNvSpPr/>
+          <p:nvPr/>
+        </p:nvSpPr>
+        <p:spPr>
+          <a:xfrm rot="20175833">
+            <a:off x="5224920" y="2286967"/>
+            <a:ext cx="1965960" cy="228600"/>
+          </a:xfrm>
+          <a:prstGeom prst="roundRect">
+            <a:avLst>
+              <a:gd name="adj" fmla="val 50000"/>
+            </a:avLst>
+          </a:prstGeom>
+        </p:spPr>
+        <p:style>
+          <a:lnRef idx="1">
+            <a:schemeClr val="dk1"/>
+          </a:lnRef>
+          <a:fillRef idx="2">
+            <a:schemeClr val="dk1"/>
+          </a:fillRef>
+          <a:effectRef idx="1">
+            <a:schemeClr val="dk1"/>
+          </a:effectRef>
+          <a:fontRef idx="minor">
+            <a:schemeClr val="dk1"/>
+          </a:fontRef>
+        </p:style>
+        <p:txBody>
+          <a:bodyPr rtlCol="0" anchor="ctr"/>
+          <a:lstStyle/>
+          <a:p>
+            <a:pPr algn="ctr"/>
+            <a:endParaRPr lang="en-US" dirty="0"/>
+          </a:p>
+        </p:txBody>
+      </p:sp>
+      <p:sp>
+        <p:nvSpPr>
+          <p:cNvPr id="23" name="Rounded Rectangle 3">
+            <a:extLst>
+              <a:ext uri="{FF2B5EF4-FFF2-40B4-BE49-F238E27FC236}">
+                <a16:creationId xmlns:a16="http://schemas.microsoft.com/office/drawing/2014/main" id="{51AB1E0D-CD1E-4DC4-8F50-C5C72B3E3A12}"/>
+              </a:ext>
+            </a:extLst>
+          </p:cNvPr>
+          <p:cNvSpPr/>
+          <p:nvPr/>
+        </p:nvSpPr>
+        <p:spPr>
+          <a:xfrm rot="16200000">
+            <a:off x="8161899" y="5422912"/>
+            <a:ext cx="840252" cy="228600"/>
+          </a:xfrm>
+          <a:prstGeom prst="roundRect">
+            <a:avLst>
+              <a:gd name="adj" fmla="val 50000"/>
+            </a:avLst>
+          </a:prstGeom>
+        </p:spPr>
+        <p:style>
+          <a:lnRef idx="1">
+            <a:schemeClr val="dk1"/>
+          </a:lnRef>
+          <a:fillRef idx="2">
+            <a:schemeClr val="dk1"/>
+          </a:fillRef>
+          <a:effectRef idx="1">
+            <a:schemeClr val="dk1"/>
+          </a:effectRef>
+          <a:fontRef idx="minor">
+            <a:schemeClr val="dk1"/>
+          </a:fontRef>
+        </p:style>
+        <p:txBody>
+          <a:bodyPr rtlCol="0" anchor="ctr"/>
+          <a:lstStyle/>
+          <a:p>
+            <a:pPr algn="ctr"/>
+            <a:endParaRPr lang="en-US" dirty="0"/>
+          </a:p>
+        </p:txBody>
+      </p:sp>
+      <p:sp>
+        <p:nvSpPr>
+          <p:cNvPr id="22" name="Rounded Rectangle 3">
+            <a:extLst>
+              <a:ext uri="{FF2B5EF4-FFF2-40B4-BE49-F238E27FC236}">
+                <a16:creationId xmlns:a16="http://schemas.microsoft.com/office/drawing/2014/main" id="{C24D66B5-09B3-4DA4-B02F-A7230C712B3F}"/>
+              </a:ext>
+            </a:extLst>
+          </p:cNvPr>
+          <p:cNvSpPr/>
+          <p:nvPr/>
+        </p:nvSpPr>
+        <p:spPr>
+          <a:xfrm rot="16200000">
+            <a:off x="3395055" y="5422913"/>
+            <a:ext cx="840252" cy="228600"/>
+          </a:xfrm>
+          <a:prstGeom prst="roundRect">
+            <a:avLst>
+              <a:gd name="adj" fmla="val 50000"/>
+            </a:avLst>
+          </a:prstGeom>
+        </p:spPr>
+        <p:style>
+          <a:lnRef idx="1">
+            <a:schemeClr val="dk1"/>
+          </a:lnRef>
+          <a:fillRef idx="2">
+            <a:schemeClr val="dk1"/>
+          </a:fillRef>
+          <a:effectRef idx="1">
+            <a:schemeClr val="dk1"/>
+          </a:effectRef>
+          <a:fontRef idx="minor">
+            <a:schemeClr val="dk1"/>
+          </a:fontRef>
+        </p:style>
+        <p:txBody>
+          <a:bodyPr rtlCol="0" anchor="ctr"/>
+          <a:lstStyle/>
+          <a:p>
+            <a:pPr algn="ctr"/>
+            <a:endParaRPr lang="en-US" dirty="0"/>
+          </a:p>
+        </p:txBody>
+      </p:sp>
+      <p:sp>
+        <p:nvSpPr>
+          <p:cNvPr id="19" name="Rounded Rectangle 3">
+            <a:extLst>
+              <a:ext uri="{FF2B5EF4-FFF2-40B4-BE49-F238E27FC236}">
+                <a16:creationId xmlns:a16="http://schemas.microsoft.com/office/drawing/2014/main" id="{A067E73A-643F-41AF-A755-71F7E52DC599}"/>
+              </a:ext>
+            </a:extLst>
+          </p:cNvPr>
+          <p:cNvSpPr/>
+          <p:nvPr/>
+        </p:nvSpPr>
+        <p:spPr>
+          <a:xfrm rot="20175833">
+            <a:off x="3618461" y="2296492"/>
+            <a:ext cx="1965960" cy="228600"/>
+          </a:xfrm>
+          <a:prstGeom prst="roundRect">
+            <a:avLst>
+              <a:gd name="adj" fmla="val 50000"/>
+            </a:avLst>
+          </a:prstGeom>
+        </p:spPr>
+        <p:style>
+          <a:lnRef idx="1">
+            <a:schemeClr val="dk1"/>
+          </a:lnRef>
+          <a:fillRef idx="2">
+            <a:schemeClr val="dk1"/>
+          </a:fillRef>
+          <a:effectRef idx="1">
+            <a:schemeClr val="dk1"/>
+          </a:effectRef>
+          <a:fontRef idx="minor">
+            <a:schemeClr val="dk1"/>
+          </a:fontRef>
+        </p:style>
+        <p:txBody>
+          <a:bodyPr rtlCol="0" anchor="ctr"/>
+          <a:lstStyle/>
+          <a:p>
+            <a:pPr algn="ctr"/>
+            <a:endParaRPr lang="en-US" dirty="0"/>
+          </a:p>
+        </p:txBody>
+      </p:sp>
+      <p:sp>
+        <p:nvSpPr>
+          <p:cNvPr id="20" name="Rounded Rectangle 3">
+            <a:extLst>
+              <a:ext uri="{FF2B5EF4-FFF2-40B4-BE49-F238E27FC236}">
+                <a16:creationId xmlns:a16="http://schemas.microsoft.com/office/drawing/2014/main" id="{804B9953-AD0C-4DB6-9CD0-19718F624306}"/>
+              </a:ext>
+            </a:extLst>
+          </p:cNvPr>
+          <p:cNvSpPr/>
+          <p:nvPr/>
+        </p:nvSpPr>
+        <p:spPr>
+          <a:xfrm rot="1424167" flipH="1">
+            <a:off x="6798943" y="2286967"/>
+            <a:ext cx="1965960" cy="228600"/>
+          </a:xfrm>
+          <a:prstGeom prst="roundRect">
+            <a:avLst>
+              <a:gd name="adj" fmla="val 50000"/>
+            </a:avLst>
+          </a:prstGeom>
+        </p:spPr>
+        <p:style>
+          <a:lnRef idx="1">
+            <a:schemeClr val="dk1"/>
+          </a:lnRef>
+          <a:fillRef idx="2">
+            <a:schemeClr val="dk1"/>
+          </a:fillRef>
+          <a:effectRef idx="1">
+            <a:schemeClr val="dk1"/>
+          </a:effectRef>
+          <a:fontRef idx="minor">
+            <a:schemeClr val="dk1"/>
+          </a:fontRef>
+        </p:style>
+        <p:txBody>
+          <a:bodyPr rtlCol="0" anchor="ctr"/>
+          <a:lstStyle/>
+          <a:p>
+            <a:pPr algn="ctr"/>
+            <a:endParaRPr lang="en-US" dirty="0"/>
+          </a:p>
+        </p:txBody>
+      </p:sp>
+      <p:sp>
+        <p:nvSpPr>
+          <p:cNvPr id="21" name="Rounded Rectangle 3">
+            <a:extLst>
+              <a:ext uri="{FF2B5EF4-FFF2-40B4-BE49-F238E27FC236}">
+                <a16:creationId xmlns:a16="http://schemas.microsoft.com/office/drawing/2014/main" id="{1E6BA7A4-9EE9-44B7-A734-A57991052519}"/>
+              </a:ext>
+            </a:extLst>
+          </p:cNvPr>
+          <p:cNvSpPr/>
+          <p:nvPr/>
+        </p:nvSpPr>
+        <p:spPr>
+          <a:xfrm rot="18076978">
+            <a:off x="3057695" y="3908068"/>
+            <a:ext cx="3108960" cy="228600"/>
+          </a:xfrm>
+          <a:prstGeom prst="roundRect">
+            <a:avLst>
+              <a:gd name="adj" fmla="val 50000"/>
+            </a:avLst>
+          </a:prstGeom>
+        </p:spPr>
+        <p:style>
+          <a:lnRef idx="1">
+            <a:schemeClr val="dk1"/>
+          </a:lnRef>
+          <a:fillRef idx="2">
+            <a:schemeClr val="dk1"/>
+          </a:fillRef>
+          <a:effectRef idx="1">
+            <a:schemeClr val="dk1"/>
+          </a:effectRef>
+          <a:fontRef idx="minor">
+            <a:schemeClr val="dk1"/>
+          </a:fontRef>
+        </p:style>
+        <p:txBody>
+          <a:bodyPr rtlCol="0" anchor="ctr"/>
+          <a:lstStyle/>
+          <a:p>
+            <a:pPr algn="ctr"/>
+            <a:endParaRPr lang="en-US" dirty="0"/>
+          </a:p>
+        </p:txBody>
+      </p:sp>
+      <p:sp>
+        <p:nvSpPr>
+          <p:cNvPr id="15" name="Rounded Rectangle 3">
+            <a:extLst>
+              <a:ext uri="{FF2B5EF4-FFF2-40B4-BE49-F238E27FC236}">
+                <a16:creationId xmlns:a16="http://schemas.microsoft.com/office/drawing/2014/main" id="{B0855921-9931-4354-AE03-39F0DC50CB1A}"/>
+              </a:ext>
+            </a:extLst>
+          </p:cNvPr>
+          <p:cNvSpPr/>
+          <p:nvPr/>
+        </p:nvSpPr>
+        <p:spPr>
+          <a:xfrm>
+            <a:off x="6867524" y="2631643"/>
+            <a:ext cx="1828800" cy="228600"/>
+          </a:xfrm>
+          <a:prstGeom prst="roundRect">
+            <a:avLst>
+              <a:gd name="adj" fmla="val 50000"/>
+            </a:avLst>
+          </a:prstGeom>
+        </p:spPr>
+        <p:style>
+          <a:lnRef idx="1">
+            <a:schemeClr val="dk1"/>
+          </a:lnRef>
+          <a:fillRef idx="2">
+            <a:schemeClr val="dk1"/>
+          </a:fillRef>
+          <a:effectRef idx="1">
+            <a:schemeClr val="dk1"/>
+          </a:effectRef>
+          <a:fontRef idx="minor">
+            <a:schemeClr val="dk1"/>
+          </a:fontRef>
+        </p:style>
+        <p:txBody>
+          <a:bodyPr rtlCol="0" anchor="ctr"/>
+          <a:lstStyle/>
+          <a:p>
+            <a:pPr algn="ctr"/>
+            <a:endParaRPr lang="en-US" dirty="0"/>
+          </a:p>
+        </p:txBody>
+      </p:sp>
+      <p:sp>
+        <p:nvSpPr>
+          <p:cNvPr id="2" name="Title 1">
+            <a:extLst>
+              <a:ext uri="{FF2B5EF4-FFF2-40B4-BE49-F238E27FC236}">
+                <a16:creationId xmlns:a16="http://schemas.microsoft.com/office/drawing/2014/main" id="{AA46BD07-1834-45C8-BEE3-2A9D846A1146}"/>
+              </a:ext>
+            </a:extLst>
+          </p:cNvPr>
+          <p:cNvSpPr>
+            <a:spLocks noGrp="1"/>
+          </p:cNvSpPr>
+          <p:nvPr>
+            <p:ph type="title"/>
+          </p:nvPr>
+        </p:nvSpPr>
+        <p:spPr/>
+        <p:txBody>
+          <a:bodyPr/>
+          <a:lstStyle/>
+          <a:p>
+            <a:r>
+              <a:rPr lang="en-US" dirty="0"/>
+              <a:t>Method of Joints Worked Example</a:t>
+            </a:r>
+          </a:p>
+        </p:txBody>
+      </p:sp>
+      <p:sp>
+        <p:nvSpPr>
+          <p:cNvPr id="3" name="Content Placeholder 2">
+            <a:extLst>
+              <a:ext uri="{FF2B5EF4-FFF2-40B4-BE49-F238E27FC236}">
+                <a16:creationId xmlns:a16="http://schemas.microsoft.com/office/drawing/2014/main" id="{F66875F8-4F20-46A3-B35C-D38AB0902813}"/>
+              </a:ext>
+            </a:extLst>
+          </p:cNvPr>
+          <p:cNvSpPr>
+            <a:spLocks noGrp="1"/>
+          </p:cNvSpPr>
+          <p:nvPr>
+            <p:ph idx="1"/>
+          </p:nvPr>
+        </p:nvSpPr>
+        <p:spPr>
+          <a:xfrm>
+            <a:off x="194845" y="1600201"/>
+            <a:ext cx="2765159" cy="4756148"/>
+          </a:xfrm>
+        </p:spPr>
+        <p:txBody>
+          <a:bodyPr>
+            <a:normAutofit fontScale="92500" lnSpcReduction="20000"/>
+          </a:bodyPr>
+          <a:lstStyle/>
+          <a:p>
+            <a:r>
+              <a:rPr lang="en-US" dirty="0"/>
+              <a:t>Use the method of joints to find the forces in all members of the truss shown to the right. Remember to specify tension or compression.</a:t>
+            </a:r>
+          </a:p>
+          <a:p>
+            <a:endParaRPr lang="en-US" dirty="0"/>
+          </a:p>
+        </p:txBody>
+      </p:sp>
+      <p:sp>
+        <p:nvSpPr>
+          <p:cNvPr id="4" name="Slide Number Placeholder 3">
+            <a:extLst>
+              <a:ext uri="{FF2B5EF4-FFF2-40B4-BE49-F238E27FC236}">
+                <a16:creationId xmlns:a16="http://schemas.microsoft.com/office/drawing/2014/main" id="{D5D8D44C-5466-4B5C-8EAA-DBBDB6072264}"/>
+              </a:ext>
+            </a:extLst>
+          </p:cNvPr>
+          <p:cNvSpPr>
+            <a:spLocks noGrp="1"/>
+          </p:cNvSpPr>
+          <p:nvPr>
+            <p:ph type="sldNum" sz="quarter" idx="12"/>
+          </p:nvPr>
+        </p:nvSpPr>
+        <p:spPr/>
+        <p:txBody>
+          <a:bodyPr/>
+          <a:lstStyle/>
+          <a:p>
+            <a:fld id="{929262FE-7F58-4A1E-8AF3-5A510A86DEBD}" type="slidenum">
+              <a:rPr lang="en-US" smtClean="0"/>
+              <a:t>12</a:t>
+            </a:fld>
+            <a:endParaRPr lang="en-US"/>
+          </a:p>
+        </p:txBody>
+      </p:sp>
+      <p:sp>
+        <p:nvSpPr>
+          <p:cNvPr id="5" name="Rectangle 4">
+            <a:extLst>
+              <a:ext uri="{FF2B5EF4-FFF2-40B4-BE49-F238E27FC236}">
+                <a16:creationId xmlns:a16="http://schemas.microsoft.com/office/drawing/2014/main" id="{36DFD21F-1544-4DBC-B963-C80026C87253}"/>
+              </a:ext>
+            </a:extLst>
+          </p:cNvPr>
+          <p:cNvSpPr/>
+          <p:nvPr/>
+        </p:nvSpPr>
+        <p:spPr>
+          <a:xfrm flipV="1">
+            <a:off x="3429001" y="5703910"/>
+            <a:ext cx="5715000" cy="1154090"/>
+          </a:xfrm>
+          <a:prstGeom prst="rect">
+            <a:avLst/>
+          </a:prstGeom>
+        </p:spPr>
+        <p:style>
+          <a:lnRef idx="2">
+            <a:schemeClr val="accent3">
+              <a:shade val="50000"/>
+            </a:schemeClr>
+          </a:lnRef>
+          <a:fillRef idx="1">
+            <a:schemeClr val="accent3"/>
+          </a:fillRef>
+          <a:effectRef idx="0">
+            <a:schemeClr val="accent3"/>
+          </a:effectRef>
+          <a:fontRef idx="minor">
+            <a:schemeClr val="lt1"/>
+          </a:fontRef>
+        </p:style>
+        <p:txBody>
+          <a:bodyPr rtlCol="0" anchor="ctr"/>
+          <a:lstStyle/>
+          <a:p>
+            <a:pPr algn="ctr"/>
+            <a:endParaRPr lang="en-US" dirty="0"/>
+          </a:p>
+        </p:txBody>
+      </p:sp>
+      <p:cxnSp>
+        <p:nvCxnSpPr>
+          <p:cNvPr id="6" name="Straight Arrow Connector 5">
+            <a:extLst>
+              <a:ext uri="{FF2B5EF4-FFF2-40B4-BE49-F238E27FC236}">
+                <a16:creationId xmlns:a16="http://schemas.microsoft.com/office/drawing/2014/main" id="{21FE8A71-FFC2-4620-831F-1F85FB1DC213}"/>
+              </a:ext>
+            </a:extLst>
+          </p:cNvPr>
+          <p:cNvCxnSpPr/>
+          <p:nvPr/>
+        </p:nvCxnSpPr>
+        <p:spPr>
+          <a:xfrm>
+            <a:off x="3831224" y="6534150"/>
+            <a:ext cx="609600" cy="5834"/>
+          </a:xfrm>
+          <a:prstGeom prst="straightConnector1">
+            <a:avLst/>
+          </a:prstGeom>
+          <a:ln>
+            <a:tailEnd type="arrow"/>
+          </a:ln>
+        </p:spPr>
+        <p:style>
+          <a:lnRef idx="2">
+            <a:schemeClr val="dk1"/>
+          </a:lnRef>
+          <a:fillRef idx="0">
+            <a:schemeClr val="dk1"/>
+          </a:fillRef>
+          <a:effectRef idx="1">
+            <a:schemeClr val="dk1"/>
+          </a:effectRef>
+          <a:fontRef idx="minor">
+            <a:schemeClr val="tx1"/>
+          </a:fontRef>
+        </p:style>
+      </p:cxnSp>
+      <p:cxnSp>
+        <p:nvCxnSpPr>
+          <p:cNvPr id="7" name="Straight Arrow Connector 6">
+            <a:extLst>
+              <a:ext uri="{FF2B5EF4-FFF2-40B4-BE49-F238E27FC236}">
+                <a16:creationId xmlns:a16="http://schemas.microsoft.com/office/drawing/2014/main" id="{490D6D65-A3FF-4EA2-AFA3-5B17FB904B87}"/>
+              </a:ext>
+            </a:extLst>
+          </p:cNvPr>
+          <p:cNvCxnSpPr>
+            <a:cxnSpLocks/>
+          </p:cNvCxnSpPr>
+          <p:nvPr/>
+        </p:nvCxnSpPr>
+        <p:spPr>
+          <a:xfrm flipV="1">
+            <a:off x="3819525" y="6057816"/>
+            <a:ext cx="11699" cy="472643"/>
+          </a:xfrm>
+          <a:prstGeom prst="straightConnector1">
+            <a:avLst/>
+          </a:prstGeom>
+          <a:ln>
+            <a:tailEnd type="arrow"/>
+          </a:ln>
+        </p:spPr>
+        <p:style>
+          <a:lnRef idx="2">
+            <a:schemeClr val="dk1"/>
+          </a:lnRef>
+          <a:fillRef idx="0">
+            <a:schemeClr val="dk1"/>
+          </a:fillRef>
+          <a:effectRef idx="1">
+            <a:schemeClr val="dk1"/>
+          </a:effectRef>
+          <a:fontRef idx="minor">
+            <a:schemeClr val="tx1"/>
+          </a:fontRef>
+        </p:style>
+      </p:cxnSp>
+      <p:sp>
+        <p:nvSpPr>
+          <p:cNvPr id="8" name="TextBox 7">
+            <a:extLst>
+              <a:ext uri="{FF2B5EF4-FFF2-40B4-BE49-F238E27FC236}">
+                <a16:creationId xmlns:a16="http://schemas.microsoft.com/office/drawing/2014/main" id="{440818A0-7F8B-46BB-832E-B7EB3D3D0633}"/>
+              </a:ext>
+            </a:extLst>
+          </p:cNvPr>
+          <p:cNvSpPr txBox="1"/>
+          <p:nvPr/>
+        </p:nvSpPr>
+        <p:spPr>
+          <a:xfrm>
+            <a:off x="4500146" y="6345793"/>
+            <a:ext cx="338554" cy="369332"/>
+          </a:xfrm>
+          <a:prstGeom prst="rect">
+            <a:avLst/>
+          </a:prstGeom>
+          <a:noFill/>
+        </p:spPr>
+        <p:txBody>
+          <a:bodyPr wrap="none" rtlCol="0">
+            <a:spAutoFit/>
+          </a:bodyPr>
+          <a:lstStyle/>
+          <a:p>
+            <a:r>
+              <a:rPr lang="en-US" b="1" dirty="0"/>
+              <a:t>X</a:t>
+            </a:r>
+            <a:endParaRPr lang="en-US" dirty="0"/>
+          </a:p>
+        </p:txBody>
+      </p:sp>
+      <p:sp>
+        <p:nvSpPr>
+          <p:cNvPr id="9" name="TextBox 8">
+            <a:extLst>
+              <a:ext uri="{FF2B5EF4-FFF2-40B4-BE49-F238E27FC236}">
+                <a16:creationId xmlns:a16="http://schemas.microsoft.com/office/drawing/2014/main" id="{C6B6D1F7-8901-468E-A80C-DCBFF6C57862}"/>
+              </a:ext>
+            </a:extLst>
+          </p:cNvPr>
+          <p:cNvSpPr txBox="1"/>
+          <p:nvPr/>
+        </p:nvSpPr>
+        <p:spPr>
+          <a:xfrm>
+            <a:off x="3800477" y="5753948"/>
+            <a:ext cx="338554" cy="369332"/>
+          </a:xfrm>
+          <a:prstGeom prst="rect">
+            <a:avLst/>
+          </a:prstGeom>
+          <a:noFill/>
+        </p:spPr>
+        <p:txBody>
+          <a:bodyPr wrap="none" rtlCol="0">
+            <a:spAutoFit/>
+          </a:bodyPr>
+          <a:lstStyle/>
+          <a:p>
+            <a:r>
+              <a:rPr lang="en-US" b="1" dirty="0"/>
+              <a:t>Y</a:t>
+            </a:r>
+            <a:endParaRPr lang="en-US" dirty="0"/>
+          </a:p>
+        </p:txBody>
+      </p:sp>
+      <p:sp>
+        <p:nvSpPr>
+          <p:cNvPr id="10" name="Rounded Rectangle 3">
+            <a:extLst>
+              <a:ext uri="{FF2B5EF4-FFF2-40B4-BE49-F238E27FC236}">
+                <a16:creationId xmlns:a16="http://schemas.microsoft.com/office/drawing/2014/main" id="{1A2E5E7D-5D9D-4076-9C46-E385586F9E7E}"/>
+              </a:ext>
+            </a:extLst>
+          </p:cNvPr>
+          <p:cNvSpPr/>
+          <p:nvPr/>
+        </p:nvSpPr>
+        <p:spPr>
+          <a:xfrm rot="16200000">
+            <a:off x="2447925" y="3895725"/>
+            <a:ext cx="2743200" cy="228600"/>
+          </a:xfrm>
+          <a:prstGeom prst="roundRect">
+            <a:avLst>
+              <a:gd name="adj" fmla="val 50000"/>
+            </a:avLst>
+          </a:prstGeom>
+        </p:spPr>
+        <p:style>
+          <a:lnRef idx="1">
+            <a:schemeClr val="dk1"/>
+          </a:lnRef>
+          <a:fillRef idx="2">
+            <a:schemeClr val="dk1"/>
+          </a:fillRef>
+          <a:effectRef idx="1">
+            <a:schemeClr val="dk1"/>
+          </a:effectRef>
+          <a:fontRef idx="minor">
+            <a:schemeClr val="dk1"/>
+          </a:fontRef>
+        </p:style>
+        <p:txBody>
+          <a:bodyPr rtlCol="0" anchor="ctr"/>
+          <a:lstStyle/>
+          <a:p>
+            <a:pPr algn="ctr"/>
+            <a:endParaRPr lang="en-US" dirty="0"/>
+          </a:p>
+        </p:txBody>
+      </p:sp>
+      <p:sp>
+        <p:nvSpPr>
+          <p:cNvPr id="12" name="Rounded Rectangle 3">
+            <a:extLst>
+              <a:ext uri="{FF2B5EF4-FFF2-40B4-BE49-F238E27FC236}">
+                <a16:creationId xmlns:a16="http://schemas.microsoft.com/office/drawing/2014/main" id="{6EF85A14-DE4B-441B-87D0-252862C829BC}"/>
+              </a:ext>
+            </a:extLst>
+          </p:cNvPr>
+          <p:cNvSpPr/>
+          <p:nvPr/>
+        </p:nvSpPr>
+        <p:spPr>
+          <a:xfrm rot="16200000">
+            <a:off x="7210425" y="3884613"/>
+            <a:ext cx="2743200" cy="228600"/>
+          </a:xfrm>
+          <a:prstGeom prst="roundRect">
+            <a:avLst>
+              <a:gd name="adj" fmla="val 50000"/>
+            </a:avLst>
+          </a:prstGeom>
+        </p:spPr>
+        <p:style>
+          <a:lnRef idx="1">
+            <a:schemeClr val="dk1"/>
+          </a:lnRef>
+          <a:fillRef idx="2">
+            <a:schemeClr val="dk1"/>
+          </a:fillRef>
+          <a:effectRef idx="1">
+            <a:schemeClr val="dk1"/>
+          </a:effectRef>
+          <a:fontRef idx="minor">
+            <a:schemeClr val="dk1"/>
+          </a:fontRef>
+        </p:style>
+        <p:txBody>
+          <a:bodyPr rtlCol="0" anchor="ctr"/>
+          <a:lstStyle/>
+          <a:p>
+            <a:pPr algn="ctr"/>
+            <a:endParaRPr lang="en-US" dirty="0"/>
+          </a:p>
+        </p:txBody>
+      </p:sp>
+      <p:sp>
+        <p:nvSpPr>
+          <p:cNvPr id="13" name="Rounded Rectangle 3">
+            <a:extLst>
+              <a:ext uri="{FF2B5EF4-FFF2-40B4-BE49-F238E27FC236}">
+                <a16:creationId xmlns:a16="http://schemas.microsoft.com/office/drawing/2014/main" id="{C53FE1B7-43AB-4523-9D0D-A1A605273948}"/>
+              </a:ext>
+            </a:extLst>
+          </p:cNvPr>
+          <p:cNvSpPr/>
+          <p:nvPr/>
+        </p:nvSpPr>
+        <p:spPr>
+          <a:xfrm>
+            <a:off x="3695700" y="2633277"/>
+            <a:ext cx="1828800" cy="228600"/>
+          </a:xfrm>
+          <a:prstGeom prst="roundRect">
+            <a:avLst>
+              <a:gd name="adj" fmla="val 50000"/>
+            </a:avLst>
+          </a:prstGeom>
+        </p:spPr>
+        <p:style>
+          <a:lnRef idx="1">
+            <a:schemeClr val="dk1"/>
+          </a:lnRef>
+          <a:fillRef idx="2">
+            <a:schemeClr val="dk1"/>
+          </a:fillRef>
+          <a:effectRef idx="1">
+            <a:schemeClr val="dk1"/>
+          </a:effectRef>
+          <a:fontRef idx="minor">
+            <a:schemeClr val="dk1"/>
+          </a:fontRef>
+        </p:style>
+        <p:txBody>
+          <a:bodyPr rtlCol="0" anchor="ctr"/>
+          <a:lstStyle/>
+          <a:p>
+            <a:pPr algn="ctr"/>
+            <a:endParaRPr lang="en-US" dirty="0"/>
+          </a:p>
+        </p:txBody>
+      </p:sp>
+      <p:sp>
+        <p:nvSpPr>
+          <p:cNvPr id="14" name="Rounded Rectangle 3">
+            <a:extLst>
+              <a:ext uri="{FF2B5EF4-FFF2-40B4-BE49-F238E27FC236}">
+                <a16:creationId xmlns:a16="http://schemas.microsoft.com/office/drawing/2014/main" id="{315B3610-E39F-408F-8D55-4E7323A12803}"/>
+              </a:ext>
+            </a:extLst>
+          </p:cNvPr>
+          <p:cNvSpPr/>
+          <p:nvPr/>
+        </p:nvSpPr>
+        <p:spPr>
+          <a:xfrm>
+            <a:off x="5281612" y="2632460"/>
+            <a:ext cx="1828800" cy="228600"/>
+          </a:xfrm>
+          <a:prstGeom prst="roundRect">
+            <a:avLst>
+              <a:gd name="adj" fmla="val 50000"/>
+            </a:avLst>
+          </a:prstGeom>
+        </p:spPr>
+        <p:style>
+          <a:lnRef idx="1">
+            <a:schemeClr val="dk1"/>
+          </a:lnRef>
+          <a:fillRef idx="2">
+            <a:schemeClr val="dk1"/>
+          </a:fillRef>
+          <a:effectRef idx="1">
+            <a:schemeClr val="dk1"/>
+          </a:effectRef>
+          <a:fontRef idx="minor">
+            <a:schemeClr val="dk1"/>
+          </a:fontRef>
+        </p:style>
+        <p:txBody>
+          <a:bodyPr rtlCol="0" anchor="ctr"/>
+          <a:lstStyle/>
+          <a:p>
+            <a:pPr algn="ctr"/>
+            <a:endParaRPr lang="en-US" dirty="0"/>
+          </a:p>
+        </p:txBody>
+      </p:sp>
+      <p:sp>
+        <p:nvSpPr>
+          <p:cNvPr id="16" name="Rounded Rectangle 3">
+            <a:extLst>
+              <a:ext uri="{FF2B5EF4-FFF2-40B4-BE49-F238E27FC236}">
+                <a16:creationId xmlns:a16="http://schemas.microsoft.com/office/drawing/2014/main" id="{6C97464D-EA87-46D4-9042-5DA3FA349912}"/>
+              </a:ext>
+            </a:extLst>
+          </p:cNvPr>
+          <p:cNvSpPr/>
+          <p:nvPr/>
+        </p:nvSpPr>
+        <p:spPr>
+          <a:xfrm>
+            <a:off x="5286374" y="1929536"/>
+            <a:ext cx="1828800" cy="228600"/>
+          </a:xfrm>
+          <a:prstGeom prst="roundRect">
+            <a:avLst>
+              <a:gd name="adj" fmla="val 50000"/>
+            </a:avLst>
+          </a:prstGeom>
+        </p:spPr>
+        <p:style>
+          <a:lnRef idx="1">
+            <a:schemeClr val="dk1"/>
+          </a:lnRef>
+          <a:fillRef idx="2">
+            <a:schemeClr val="dk1"/>
+          </a:fillRef>
+          <a:effectRef idx="1">
+            <a:schemeClr val="dk1"/>
+          </a:effectRef>
+          <a:fontRef idx="minor">
+            <a:schemeClr val="dk1"/>
+          </a:fontRef>
+        </p:style>
+        <p:txBody>
+          <a:bodyPr rtlCol="0" anchor="ctr"/>
+          <a:lstStyle/>
+          <a:p>
+            <a:pPr algn="ctr"/>
+            <a:endParaRPr lang="en-US" dirty="0"/>
+          </a:p>
+        </p:txBody>
+      </p:sp>
+      <p:sp>
+        <p:nvSpPr>
+          <p:cNvPr id="17" name="Rounded Rectangle 3">
+            <a:extLst>
+              <a:ext uri="{FF2B5EF4-FFF2-40B4-BE49-F238E27FC236}">
+                <a16:creationId xmlns:a16="http://schemas.microsoft.com/office/drawing/2014/main" id="{5351462C-4AFB-41F2-AA26-F1AB298822CF}"/>
+              </a:ext>
+            </a:extLst>
+          </p:cNvPr>
+          <p:cNvSpPr/>
+          <p:nvPr/>
+        </p:nvSpPr>
+        <p:spPr>
+          <a:xfrm rot="16200000">
+            <a:off x="4929189" y="2272437"/>
+            <a:ext cx="914400" cy="228600"/>
+          </a:xfrm>
+          <a:prstGeom prst="roundRect">
+            <a:avLst>
+              <a:gd name="adj" fmla="val 50000"/>
+            </a:avLst>
+          </a:prstGeom>
+        </p:spPr>
+        <p:style>
+          <a:lnRef idx="1">
+            <a:schemeClr val="dk1"/>
+          </a:lnRef>
+          <a:fillRef idx="2">
+            <a:schemeClr val="dk1"/>
+          </a:fillRef>
+          <a:effectRef idx="1">
+            <a:schemeClr val="dk1"/>
+          </a:effectRef>
+          <a:fontRef idx="minor">
+            <a:schemeClr val="dk1"/>
+          </a:fontRef>
+        </p:style>
+        <p:txBody>
+          <a:bodyPr rtlCol="0" anchor="ctr"/>
+          <a:lstStyle/>
+          <a:p>
+            <a:pPr algn="ctr"/>
+            <a:endParaRPr lang="en-US" dirty="0"/>
+          </a:p>
+        </p:txBody>
+      </p:sp>
+      <p:sp>
+        <p:nvSpPr>
+          <p:cNvPr id="18" name="Rounded Rectangle 3">
+            <a:extLst>
+              <a:ext uri="{FF2B5EF4-FFF2-40B4-BE49-F238E27FC236}">
+                <a16:creationId xmlns:a16="http://schemas.microsoft.com/office/drawing/2014/main" id="{2A428D4D-B396-4932-A92E-D8D35861F7ED}"/>
+              </a:ext>
+            </a:extLst>
+          </p:cNvPr>
+          <p:cNvSpPr/>
+          <p:nvPr/>
+        </p:nvSpPr>
+        <p:spPr>
+          <a:xfrm rot="16200000">
+            <a:off x="6538912" y="2272436"/>
+            <a:ext cx="914400" cy="228600"/>
+          </a:xfrm>
+          <a:prstGeom prst="roundRect">
+            <a:avLst>
+              <a:gd name="adj" fmla="val 50000"/>
+            </a:avLst>
+          </a:prstGeom>
+        </p:spPr>
+        <p:style>
+          <a:lnRef idx="1">
+            <a:schemeClr val="dk1"/>
+          </a:lnRef>
+          <a:fillRef idx="2">
+            <a:schemeClr val="dk1"/>
+          </a:fillRef>
+          <a:effectRef idx="1">
+            <a:schemeClr val="dk1"/>
+          </a:effectRef>
+          <a:fontRef idx="minor">
+            <a:schemeClr val="dk1"/>
+          </a:fontRef>
+        </p:style>
+        <p:txBody>
+          <a:bodyPr rtlCol="0" anchor="ctr"/>
+          <a:lstStyle/>
+          <a:p>
+            <a:pPr algn="ctr"/>
+            <a:endParaRPr lang="en-US" dirty="0"/>
+          </a:p>
+        </p:txBody>
+      </p:sp>
+      <p:cxnSp>
+        <p:nvCxnSpPr>
+          <p:cNvPr id="24" name="Straight Arrow Connector 23">
+            <a:extLst>
+              <a:ext uri="{FF2B5EF4-FFF2-40B4-BE49-F238E27FC236}">
+                <a16:creationId xmlns:a16="http://schemas.microsoft.com/office/drawing/2014/main" id="{251B87CC-683E-44E1-A511-56D577279151}"/>
+              </a:ext>
+            </a:extLst>
+          </p:cNvPr>
+          <p:cNvCxnSpPr/>
+          <p:nvPr/>
+        </p:nvCxnSpPr>
+        <p:spPr>
+          <a:xfrm>
+            <a:off x="6991215" y="2752131"/>
+            <a:ext cx="0" cy="951141"/>
+          </a:xfrm>
+          <a:prstGeom prst="straightConnector1">
+            <a:avLst/>
+          </a:prstGeom>
+          <a:ln>
+            <a:solidFill>
+              <a:srgbClr val="FF0000"/>
+            </a:solidFill>
+            <a:tailEnd type="arrow"/>
+          </a:ln>
+        </p:spPr>
+        <p:style>
+          <a:lnRef idx="2">
+            <a:schemeClr val="accent2"/>
+          </a:lnRef>
+          <a:fillRef idx="0">
+            <a:schemeClr val="accent2"/>
+          </a:fillRef>
+          <a:effectRef idx="1">
+            <a:schemeClr val="accent2"/>
+          </a:effectRef>
+          <a:fontRef idx="minor">
+            <a:schemeClr val="tx1"/>
+          </a:fontRef>
+        </p:style>
+      </p:cxnSp>
+      <p:sp>
+        <p:nvSpPr>
+          <p:cNvPr id="25" name="TextBox 24">
+            <a:extLst>
+              <a:ext uri="{FF2B5EF4-FFF2-40B4-BE49-F238E27FC236}">
+                <a16:creationId xmlns:a16="http://schemas.microsoft.com/office/drawing/2014/main" id="{562897A4-AD9B-4F2A-85C1-ED94BA464B8C}"/>
+              </a:ext>
+            </a:extLst>
+          </p:cNvPr>
+          <p:cNvSpPr txBox="1"/>
+          <p:nvPr/>
+        </p:nvSpPr>
+        <p:spPr>
+          <a:xfrm>
+            <a:off x="6677026" y="3720391"/>
+            <a:ext cx="685800" cy="369332"/>
+          </a:xfrm>
+          <a:prstGeom prst="rect">
+            <a:avLst/>
+          </a:prstGeom>
+          <a:noFill/>
+        </p:spPr>
+        <p:txBody>
+          <a:bodyPr wrap="square" rtlCol="0">
+            <a:spAutoFit/>
+          </a:bodyPr>
+          <a:lstStyle/>
+          <a:p>
+            <a:r>
+              <a:rPr lang="en-US" dirty="0">
+                <a:solidFill>
+                  <a:srgbClr val="FF0000"/>
+                </a:solidFill>
+              </a:rPr>
+              <a:t>6 kN</a:t>
+            </a:r>
+          </a:p>
+        </p:txBody>
+      </p:sp>
+      <p:sp>
+        <p:nvSpPr>
+          <p:cNvPr id="11" name="Oval 10">
+            <a:extLst>
+              <a:ext uri="{FF2B5EF4-FFF2-40B4-BE49-F238E27FC236}">
+                <a16:creationId xmlns:a16="http://schemas.microsoft.com/office/drawing/2014/main" id="{3613E25E-4B59-46E6-8F86-1B6BC0016DCA}"/>
+              </a:ext>
+            </a:extLst>
+          </p:cNvPr>
+          <p:cNvSpPr/>
+          <p:nvPr/>
+        </p:nvSpPr>
+        <p:spPr>
+          <a:xfrm>
+            <a:off x="3781425" y="2714625"/>
+            <a:ext cx="76200" cy="76200"/>
+          </a:xfrm>
+          <a:prstGeom prst="ellipse">
+            <a:avLst/>
+          </a:prstGeom>
+        </p:spPr>
+        <p:style>
+          <a:lnRef idx="2">
+            <a:schemeClr val="dk1">
+              <a:shade val="50000"/>
+            </a:schemeClr>
+          </a:lnRef>
+          <a:fillRef idx="1">
+            <a:schemeClr val="dk1"/>
+          </a:fillRef>
+          <a:effectRef idx="0">
+            <a:schemeClr val="dk1"/>
+          </a:effectRef>
+          <a:fontRef idx="minor">
+            <a:schemeClr val="lt1"/>
+          </a:fontRef>
+        </p:style>
+        <p:txBody>
+          <a:bodyPr rtlCol="0" anchor="ctr"/>
+          <a:lstStyle/>
+          <a:p>
+            <a:pPr algn="ctr"/>
+            <a:endParaRPr lang="en-US" dirty="0"/>
+          </a:p>
+        </p:txBody>
+      </p:sp>
+      <p:sp>
+        <p:nvSpPr>
+          <p:cNvPr id="27" name="Oval 26">
+            <a:extLst>
+              <a:ext uri="{FF2B5EF4-FFF2-40B4-BE49-F238E27FC236}">
+                <a16:creationId xmlns:a16="http://schemas.microsoft.com/office/drawing/2014/main" id="{0E402DC8-E037-48BC-B36E-172D3E4C7461}"/>
+              </a:ext>
+            </a:extLst>
+          </p:cNvPr>
+          <p:cNvSpPr/>
+          <p:nvPr/>
+        </p:nvSpPr>
+        <p:spPr>
+          <a:xfrm>
+            <a:off x="5354084" y="2695083"/>
+            <a:ext cx="76200" cy="76200"/>
+          </a:xfrm>
+          <a:prstGeom prst="ellipse">
+            <a:avLst/>
+          </a:prstGeom>
+        </p:spPr>
+        <p:style>
+          <a:lnRef idx="2">
+            <a:schemeClr val="dk1">
+              <a:shade val="50000"/>
+            </a:schemeClr>
+          </a:lnRef>
+          <a:fillRef idx="1">
+            <a:schemeClr val="dk1"/>
+          </a:fillRef>
+          <a:effectRef idx="0">
+            <a:schemeClr val="dk1"/>
+          </a:effectRef>
+          <a:fontRef idx="minor">
+            <a:schemeClr val="lt1"/>
+          </a:fontRef>
+        </p:style>
+        <p:txBody>
+          <a:bodyPr rtlCol="0" anchor="ctr"/>
+          <a:lstStyle/>
+          <a:p>
+            <a:pPr algn="ctr"/>
+            <a:endParaRPr lang="en-US" dirty="0"/>
+          </a:p>
+        </p:txBody>
+      </p:sp>
+      <p:sp>
+        <p:nvSpPr>
+          <p:cNvPr id="28" name="Oval 27">
+            <a:extLst>
+              <a:ext uri="{FF2B5EF4-FFF2-40B4-BE49-F238E27FC236}">
+                <a16:creationId xmlns:a16="http://schemas.microsoft.com/office/drawing/2014/main" id="{DD903EF1-C3DF-4498-B5C9-A17A88DD69A8}"/>
+              </a:ext>
+            </a:extLst>
+          </p:cNvPr>
+          <p:cNvSpPr/>
+          <p:nvPr/>
+        </p:nvSpPr>
+        <p:spPr>
+          <a:xfrm>
+            <a:off x="8543925" y="2724150"/>
+            <a:ext cx="76200" cy="76200"/>
+          </a:xfrm>
+          <a:prstGeom prst="ellipse">
+            <a:avLst/>
+          </a:prstGeom>
+        </p:spPr>
+        <p:style>
+          <a:lnRef idx="2">
+            <a:schemeClr val="dk1">
+              <a:shade val="50000"/>
+            </a:schemeClr>
+          </a:lnRef>
+          <a:fillRef idx="1">
+            <a:schemeClr val="dk1"/>
+          </a:fillRef>
+          <a:effectRef idx="0">
+            <a:schemeClr val="dk1"/>
+          </a:effectRef>
+          <a:fontRef idx="minor">
+            <a:schemeClr val="lt1"/>
+          </a:fontRef>
+        </p:style>
+        <p:txBody>
+          <a:bodyPr rtlCol="0" anchor="ctr"/>
+          <a:lstStyle/>
+          <a:p>
+            <a:pPr algn="ctr"/>
+            <a:endParaRPr lang="en-US" dirty="0"/>
+          </a:p>
+        </p:txBody>
+      </p:sp>
+      <p:sp>
+        <p:nvSpPr>
+          <p:cNvPr id="29" name="Oval 28">
+            <a:extLst>
+              <a:ext uri="{FF2B5EF4-FFF2-40B4-BE49-F238E27FC236}">
+                <a16:creationId xmlns:a16="http://schemas.microsoft.com/office/drawing/2014/main" id="{EA8D8FB8-0057-4B6B-84D9-08A217514425}"/>
+              </a:ext>
+            </a:extLst>
+          </p:cNvPr>
+          <p:cNvSpPr/>
+          <p:nvPr/>
+        </p:nvSpPr>
+        <p:spPr>
+          <a:xfrm>
+            <a:off x="6954285" y="2694981"/>
+            <a:ext cx="76200" cy="76200"/>
+          </a:xfrm>
+          <a:prstGeom prst="ellipse">
+            <a:avLst/>
+          </a:prstGeom>
+        </p:spPr>
+        <p:style>
+          <a:lnRef idx="2">
+            <a:schemeClr val="dk1">
+              <a:shade val="50000"/>
+            </a:schemeClr>
+          </a:lnRef>
+          <a:fillRef idx="1">
+            <a:schemeClr val="dk1"/>
+          </a:fillRef>
+          <a:effectRef idx="0">
+            <a:schemeClr val="dk1"/>
+          </a:effectRef>
+          <a:fontRef idx="minor">
+            <a:schemeClr val="lt1"/>
+          </a:fontRef>
+        </p:style>
+        <p:txBody>
+          <a:bodyPr rtlCol="0" anchor="ctr"/>
+          <a:lstStyle/>
+          <a:p>
+            <a:pPr algn="ctr"/>
+            <a:endParaRPr lang="en-US" dirty="0"/>
+          </a:p>
+        </p:txBody>
+      </p:sp>
+      <p:sp>
+        <p:nvSpPr>
+          <p:cNvPr id="30" name="Oval 29">
+            <a:extLst>
+              <a:ext uri="{FF2B5EF4-FFF2-40B4-BE49-F238E27FC236}">
+                <a16:creationId xmlns:a16="http://schemas.microsoft.com/office/drawing/2014/main" id="{7019252F-0B0D-4034-8912-61765C398A31}"/>
+              </a:ext>
+            </a:extLst>
+          </p:cNvPr>
+          <p:cNvSpPr/>
+          <p:nvPr/>
+        </p:nvSpPr>
+        <p:spPr>
+          <a:xfrm>
+            <a:off x="5355981" y="2033348"/>
+            <a:ext cx="76200" cy="76200"/>
+          </a:xfrm>
+          <a:prstGeom prst="ellipse">
+            <a:avLst/>
+          </a:prstGeom>
+        </p:spPr>
+        <p:style>
+          <a:lnRef idx="2">
+            <a:schemeClr val="dk1">
+              <a:shade val="50000"/>
+            </a:schemeClr>
+          </a:lnRef>
+          <a:fillRef idx="1">
+            <a:schemeClr val="dk1"/>
+          </a:fillRef>
+          <a:effectRef idx="0">
+            <a:schemeClr val="dk1"/>
+          </a:effectRef>
+          <a:fontRef idx="minor">
+            <a:schemeClr val="lt1"/>
+          </a:fontRef>
+        </p:style>
+        <p:txBody>
+          <a:bodyPr rtlCol="0" anchor="ctr"/>
+          <a:lstStyle/>
+          <a:p>
+            <a:pPr algn="ctr"/>
+            <a:endParaRPr lang="en-US" dirty="0"/>
+          </a:p>
+        </p:txBody>
+      </p:sp>
+      <p:sp>
+        <p:nvSpPr>
+          <p:cNvPr id="31" name="Oval 30">
+            <a:extLst>
+              <a:ext uri="{FF2B5EF4-FFF2-40B4-BE49-F238E27FC236}">
+                <a16:creationId xmlns:a16="http://schemas.microsoft.com/office/drawing/2014/main" id="{5ECD78AE-60C5-4EDE-93E9-9CE992E6A99C}"/>
+              </a:ext>
+            </a:extLst>
+          </p:cNvPr>
+          <p:cNvSpPr/>
+          <p:nvPr/>
+        </p:nvSpPr>
+        <p:spPr>
+          <a:xfrm>
+            <a:off x="6962775" y="2038350"/>
+            <a:ext cx="76200" cy="76200"/>
+          </a:xfrm>
+          <a:prstGeom prst="ellipse">
+            <a:avLst/>
+          </a:prstGeom>
+        </p:spPr>
+        <p:style>
+          <a:lnRef idx="2">
+            <a:schemeClr val="dk1">
+              <a:shade val="50000"/>
+            </a:schemeClr>
+          </a:lnRef>
+          <a:fillRef idx="1">
+            <a:schemeClr val="dk1"/>
+          </a:fillRef>
+          <a:effectRef idx="0">
+            <a:schemeClr val="dk1"/>
+          </a:effectRef>
+          <a:fontRef idx="minor">
+            <a:schemeClr val="lt1"/>
+          </a:fontRef>
+        </p:style>
+        <p:txBody>
+          <a:bodyPr rtlCol="0" anchor="ctr"/>
+          <a:lstStyle/>
+          <a:p>
+            <a:pPr algn="ctr"/>
+            <a:endParaRPr lang="en-US" dirty="0"/>
+          </a:p>
+        </p:txBody>
+      </p:sp>
+      <p:sp>
+        <p:nvSpPr>
+          <p:cNvPr id="32" name="Oval 31">
+            <a:extLst>
+              <a:ext uri="{FF2B5EF4-FFF2-40B4-BE49-F238E27FC236}">
+                <a16:creationId xmlns:a16="http://schemas.microsoft.com/office/drawing/2014/main" id="{FDBCBA50-03C1-4421-9A0D-74BEB6DAD29A}"/>
+              </a:ext>
+            </a:extLst>
+          </p:cNvPr>
+          <p:cNvSpPr/>
+          <p:nvPr/>
+        </p:nvSpPr>
+        <p:spPr>
+          <a:xfrm>
+            <a:off x="3781425" y="5219700"/>
+            <a:ext cx="76200" cy="76200"/>
+          </a:xfrm>
+          <a:prstGeom prst="ellipse">
+            <a:avLst/>
+          </a:prstGeom>
+        </p:spPr>
+        <p:style>
+          <a:lnRef idx="2">
+            <a:schemeClr val="dk1">
+              <a:shade val="50000"/>
+            </a:schemeClr>
+          </a:lnRef>
+          <a:fillRef idx="1">
+            <a:schemeClr val="dk1"/>
+          </a:fillRef>
+          <a:effectRef idx="0">
+            <a:schemeClr val="dk1"/>
+          </a:effectRef>
+          <a:fontRef idx="minor">
+            <a:schemeClr val="lt1"/>
+          </a:fontRef>
+        </p:style>
+        <p:txBody>
+          <a:bodyPr rtlCol="0" anchor="ctr"/>
+          <a:lstStyle/>
+          <a:p>
+            <a:pPr algn="ctr"/>
+            <a:endParaRPr lang="en-US" dirty="0"/>
+          </a:p>
+        </p:txBody>
+      </p:sp>
+      <p:sp>
+        <p:nvSpPr>
+          <p:cNvPr id="33" name="Oval 32">
+            <a:extLst>
+              <a:ext uri="{FF2B5EF4-FFF2-40B4-BE49-F238E27FC236}">
+                <a16:creationId xmlns:a16="http://schemas.microsoft.com/office/drawing/2014/main" id="{9ED4A2DE-6C54-4D77-8030-1A0D8BDE8700}"/>
+              </a:ext>
+            </a:extLst>
+          </p:cNvPr>
+          <p:cNvSpPr/>
+          <p:nvPr/>
+        </p:nvSpPr>
+        <p:spPr>
+          <a:xfrm>
+            <a:off x="8543925" y="5200650"/>
+            <a:ext cx="76200" cy="76200"/>
+          </a:xfrm>
+          <a:prstGeom prst="ellipse">
+            <a:avLst/>
+          </a:prstGeom>
+        </p:spPr>
+        <p:style>
+          <a:lnRef idx="2">
+            <a:schemeClr val="dk1">
+              <a:shade val="50000"/>
+            </a:schemeClr>
+          </a:lnRef>
+          <a:fillRef idx="1">
+            <a:schemeClr val="dk1"/>
+          </a:fillRef>
+          <a:effectRef idx="0">
+            <a:schemeClr val="dk1"/>
+          </a:effectRef>
+          <a:fontRef idx="minor">
+            <a:schemeClr val="lt1"/>
+          </a:fontRef>
+        </p:style>
+        <p:txBody>
+          <a:bodyPr rtlCol="0" anchor="ctr"/>
+          <a:lstStyle/>
+          <a:p>
+            <a:pPr algn="ctr"/>
+            <a:endParaRPr lang="en-US" dirty="0"/>
+          </a:p>
+        </p:txBody>
+      </p:sp>
+      <p:cxnSp>
+        <p:nvCxnSpPr>
+          <p:cNvPr id="35" name="Straight Connector 34">
+            <a:extLst>
+              <a:ext uri="{FF2B5EF4-FFF2-40B4-BE49-F238E27FC236}">
+                <a16:creationId xmlns:a16="http://schemas.microsoft.com/office/drawing/2014/main" id="{BFF87934-F91C-4707-8251-58A06173CF2F}"/>
+              </a:ext>
+            </a:extLst>
+          </p:cNvPr>
+          <p:cNvCxnSpPr/>
+          <p:nvPr/>
+        </p:nvCxnSpPr>
+        <p:spPr>
+          <a:xfrm flipV="1">
+            <a:off x="3281861" y="2000250"/>
+            <a:ext cx="0" cy="3276600"/>
+          </a:xfrm>
+          <a:prstGeom prst="line">
+            <a:avLst/>
+          </a:prstGeom>
+        </p:spPr>
+        <p:style>
+          <a:lnRef idx="1">
+            <a:schemeClr val="accent1"/>
+          </a:lnRef>
+          <a:fillRef idx="0">
+            <a:schemeClr val="accent1"/>
+          </a:fillRef>
+          <a:effectRef idx="0">
+            <a:schemeClr val="accent1"/>
+          </a:effectRef>
+          <a:fontRef idx="minor">
+            <a:schemeClr val="tx1"/>
+          </a:fontRef>
+        </p:style>
+      </p:cxnSp>
+      <p:sp>
+        <p:nvSpPr>
+          <p:cNvPr id="36" name="TextBox 35">
+            <a:extLst>
+              <a:ext uri="{FF2B5EF4-FFF2-40B4-BE49-F238E27FC236}">
+                <a16:creationId xmlns:a16="http://schemas.microsoft.com/office/drawing/2014/main" id="{A9B3B736-CA39-472F-B058-962D7F1AD946}"/>
+              </a:ext>
+            </a:extLst>
+          </p:cNvPr>
+          <p:cNvSpPr txBox="1"/>
+          <p:nvPr/>
+        </p:nvSpPr>
+        <p:spPr>
+          <a:xfrm>
+            <a:off x="2877048" y="3814247"/>
+            <a:ext cx="797107" cy="369332"/>
+          </a:xfrm>
+          <a:prstGeom prst="rect">
+            <a:avLst/>
+          </a:prstGeom>
+          <a:solidFill>
+            <a:schemeClr val="bg1"/>
+          </a:solidFill>
+        </p:spPr>
+        <p:txBody>
+          <a:bodyPr wrap="square" rtlCol="0">
+            <a:spAutoFit/>
+          </a:bodyPr>
+          <a:lstStyle/>
+          <a:p>
+            <a:pPr algn="ctr"/>
+            <a:r>
+              <a:rPr lang="en-US" dirty="0">
+                <a:solidFill>
+                  <a:srgbClr val="0070C0"/>
+                </a:solidFill>
+              </a:rPr>
+              <a:t>2 m</a:t>
+            </a:r>
+          </a:p>
+        </p:txBody>
+      </p:sp>
+      <p:cxnSp>
+        <p:nvCxnSpPr>
+          <p:cNvPr id="37" name="Straight Connector 36">
+            <a:extLst>
+              <a:ext uri="{FF2B5EF4-FFF2-40B4-BE49-F238E27FC236}">
+                <a16:creationId xmlns:a16="http://schemas.microsoft.com/office/drawing/2014/main" id="{ABAB10E6-E784-4287-A783-A43ACE198163}"/>
+              </a:ext>
+            </a:extLst>
+          </p:cNvPr>
+          <p:cNvCxnSpPr>
+            <a:cxnSpLocks/>
+          </p:cNvCxnSpPr>
+          <p:nvPr/>
+        </p:nvCxnSpPr>
+        <p:spPr>
+          <a:xfrm flipV="1">
+            <a:off x="2976360" y="5267325"/>
+            <a:ext cx="604339" cy="0"/>
+          </a:xfrm>
+          <a:prstGeom prst="line">
+            <a:avLst/>
+          </a:prstGeom>
+        </p:spPr>
+        <p:style>
+          <a:lnRef idx="1">
+            <a:schemeClr val="accent1"/>
+          </a:lnRef>
+          <a:fillRef idx="0">
+            <a:schemeClr val="accent1"/>
+          </a:fillRef>
+          <a:effectRef idx="0">
+            <a:schemeClr val="accent1"/>
+          </a:effectRef>
+          <a:fontRef idx="minor">
+            <a:schemeClr val="tx1"/>
+          </a:fontRef>
+        </p:style>
+      </p:cxnSp>
+      <p:cxnSp>
+        <p:nvCxnSpPr>
+          <p:cNvPr id="40" name="Straight Connector 39">
+            <a:extLst>
+              <a:ext uri="{FF2B5EF4-FFF2-40B4-BE49-F238E27FC236}">
+                <a16:creationId xmlns:a16="http://schemas.microsoft.com/office/drawing/2014/main" id="{5AFBA3F7-1C31-4D54-B123-1476398994F7}"/>
+              </a:ext>
+            </a:extLst>
+          </p:cNvPr>
+          <p:cNvCxnSpPr>
+            <a:cxnSpLocks/>
+          </p:cNvCxnSpPr>
+          <p:nvPr/>
+        </p:nvCxnSpPr>
+        <p:spPr>
+          <a:xfrm flipV="1">
+            <a:off x="2976360" y="2743200"/>
+            <a:ext cx="604339" cy="0"/>
+          </a:xfrm>
+          <a:prstGeom prst="line">
+            <a:avLst/>
+          </a:prstGeom>
+        </p:spPr>
+        <p:style>
+          <a:lnRef idx="1">
+            <a:schemeClr val="accent1"/>
+          </a:lnRef>
+          <a:fillRef idx="0">
+            <a:schemeClr val="accent1"/>
+          </a:fillRef>
+          <a:effectRef idx="0">
+            <a:schemeClr val="accent1"/>
+          </a:effectRef>
+          <a:fontRef idx="minor">
+            <a:schemeClr val="tx1"/>
+          </a:fontRef>
+        </p:style>
+      </p:cxnSp>
+      <p:cxnSp>
+        <p:nvCxnSpPr>
+          <p:cNvPr id="41" name="Straight Connector 40">
+            <a:extLst>
+              <a:ext uri="{FF2B5EF4-FFF2-40B4-BE49-F238E27FC236}">
+                <a16:creationId xmlns:a16="http://schemas.microsoft.com/office/drawing/2014/main" id="{D86E5DB6-609D-47EF-A3D1-7C7840E86E8C}"/>
+              </a:ext>
+            </a:extLst>
+          </p:cNvPr>
+          <p:cNvCxnSpPr>
+            <a:cxnSpLocks/>
+          </p:cNvCxnSpPr>
+          <p:nvPr/>
+        </p:nvCxnSpPr>
+        <p:spPr>
+          <a:xfrm>
+            <a:off x="2976360" y="2005736"/>
+            <a:ext cx="1862340" cy="0"/>
+          </a:xfrm>
+          <a:prstGeom prst="line">
+            <a:avLst/>
+          </a:prstGeom>
+        </p:spPr>
+        <p:style>
+          <a:lnRef idx="1">
+            <a:schemeClr val="accent1"/>
+          </a:lnRef>
+          <a:fillRef idx="0">
+            <a:schemeClr val="accent1"/>
+          </a:fillRef>
+          <a:effectRef idx="0">
+            <a:schemeClr val="accent1"/>
+          </a:effectRef>
+          <a:fontRef idx="minor">
+            <a:schemeClr val="tx1"/>
+          </a:fontRef>
+        </p:style>
+      </p:cxnSp>
+      <p:sp>
+        <p:nvSpPr>
+          <p:cNvPr id="44" name="TextBox 43">
+            <a:extLst>
+              <a:ext uri="{FF2B5EF4-FFF2-40B4-BE49-F238E27FC236}">
+                <a16:creationId xmlns:a16="http://schemas.microsoft.com/office/drawing/2014/main" id="{0C753050-D94A-4084-8677-3994856D04B9}"/>
+              </a:ext>
+            </a:extLst>
+          </p:cNvPr>
+          <p:cNvSpPr txBox="1"/>
+          <p:nvPr/>
+        </p:nvSpPr>
+        <p:spPr>
+          <a:xfrm>
+            <a:off x="2905125" y="2171700"/>
+            <a:ext cx="797107" cy="369332"/>
+          </a:xfrm>
+          <a:prstGeom prst="rect">
+            <a:avLst/>
+          </a:prstGeom>
+          <a:solidFill>
+            <a:schemeClr val="bg1"/>
+          </a:solidFill>
+        </p:spPr>
+        <p:txBody>
+          <a:bodyPr wrap="square" rtlCol="0">
+            <a:spAutoFit/>
+          </a:bodyPr>
+          <a:lstStyle/>
+          <a:p>
+            <a:pPr algn="ctr"/>
+            <a:r>
+              <a:rPr lang="en-US" dirty="0">
+                <a:solidFill>
+                  <a:srgbClr val="0070C0"/>
+                </a:solidFill>
+              </a:rPr>
+              <a:t>.6 m</a:t>
+            </a:r>
+          </a:p>
+        </p:txBody>
+      </p:sp>
+      <p:cxnSp>
+        <p:nvCxnSpPr>
+          <p:cNvPr id="45" name="Straight Connector 44">
+            <a:extLst>
+              <a:ext uri="{FF2B5EF4-FFF2-40B4-BE49-F238E27FC236}">
+                <a16:creationId xmlns:a16="http://schemas.microsoft.com/office/drawing/2014/main" id="{AB9037F5-4290-4BF7-93F8-04EDDBCAC84F}"/>
+              </a:ext>
+            </a:extLst>
+          </p:cNvPr>
+          <p:cNvCxnSpPr>
+            <a:cxnSpLocks/>
+          </p:cNvCxnSpPr>
+          <p:nvPr/>
+        </p:nvCxnSpPr>
+        <p:spPr>
+          <a:xfrm flipH="1" flipV="1">
+            <a:off x="3800477" y="1374766"/>
+            <a:ext cx="0" cy="1109539"/>
+          </a:xfrm>
+          <a:prstGeom prst="line">
+            <a:avLst/>
+          </a:prstGeom>
+        </p:spPr>
+        <p:style>
+          <a:lnRef idx="1">
+            <a:schemeClr val="accent1"/>
+          </a:lnRef>
+          <a:fillRef idx="0">
+            <a:schemeClr val="accent1"/>
+          </a:fillRef>
+          <a:effectRef idx="0">
+            <a:schemeClr val="accent1"/>
+          </a:effectRef>
+          <a:fontRef idx="minor">
+            <a:schemeClr val="tx1"/>
+          </a:fontRef>
+        </p:style>
+      </p:cxnSp>
+      <p:cxnSp>
+        <p:nvCxnSpPr>
+          <p:cNvPr id="48" name="Straight Connector 47">
+            <a:extLst>
+              <a:ext uri="{FF2B5EF4-FFF2-40B4-BE49-F238E27FC236}">
+                <a16:creationId xmlns:a16="http://schemas.microsoft.com/office/drawing/2014/main" id="{E891571B-696A-41FB-9287-097F0AFC7718}"/>
+              </a:ext>
+            </a:extLst>
+          </p:cNvPr>
+          <p:cNvCxnSpPr>
+            <a:cxnSpLocks/>
+          </p:cNvCxnSpPr>
+          <p:nvPr/>
+        </p:nvCxnSpPr>
+        <p:spPr>
+          <a:xfrm flipH="1" flipV="1">
+            <a:off x="8582025" y="1374766"/>
+            <a:ext cx="0" cy="1109539"/>
+          </a:xfrm>
+          <a:prstGeom prst="line">
+            <a:avLst/>
+          </a:prstGeom>
+        </p:spPr>
+        <p:style>
+          <a:lnRef idx="1">
+            <a:schemeClr val="accent1"/>
+          </a:lnRef>
+          <a:fillRef idx="0">
+            <a:schemeClr val="accent1"/>
+          </a:fillRef>
+          <a:effectRef idx="0">
+            <a:schemeClr val="accent1"/>
+          </a:effectRef>
+          <a:fontRef idx="minor">
+            <a:schemeClr val="tx1"/>
+          </a:fontRef>
+        </p:style>
+      </p:cxnSp>
+      <p:cxnSp>
+        <p:nvCxnSpPr>
+          <p:cNvPr id="49" name="Straight Connector 48">
+            <a:extLst>
+              <a:ext uri="{FF2B5EF4-FFF2-40B4-BE49-F238E27FC236}">
+                <a16:creationId xmlns:a16="http://schemas.microsoft.com/office/drawing/2014/main" id="{D0107902-1881-40AB-AA60-CDE4D5BA2AD2}"/>
+              </a:ext>
+            </a:extLst>
+          </p:cNvPr>
+          <p:cNvCxnSpPr>
+            <a:cxnSpLocks/>
+          </p:cNvCxnSpPr>
+          <p:nvPr/>
+        </p:nvCxnSpPr>
+        <p:spPr>
+          <a:xfrm flipV="1">
+            <a:off x="5386389" y="1374766"/>
+            <a:ext cx="0" cy="420574"/>
+          </a:xfrm>
+          <a:prstGeom prst="line">
+            <a:avLst/>
+          </a:prstGeom>
+        </p:spPr>
+        <p:style>
+          <a:lnRef idx="1">
+            <a:schemeClr val="accent1"/>
+          </a:lnRef>
+          <a:fillRef idx="0">
+            <a:schemeClr val="accent1"/>
+          </a:fillRef>
+          <a:effectRef idx="0">
+            <a:schemeClr val="accent1"/>
+          </a:effectRef>
+          <a:fontRef idx="minor">
+            <a:schemeClr val="tx1"/>
+          </a:fontRef>
+        </p:style>
+      </p:cxnSp>
+      <p:cxnSp>
+        <p:nvCxnSpPr>
+          <p:cNvPr id="51" name="Straight Connector 50">
+            <a:extLst>
+              <a:ext uri="{FF2B5EF4-FFF2-40B4-BE49-F238E27FC236}">
+                <a16:creationId xmlns:a16="http://schemas.microsoft.com/office/drawing/2014/main" id="{33DA2702-EF7D-4A86-8837-BB52F584AC65}"/>
+              </a:ext>
+            </a:extLst>
+          </p:cNvPr>
+          <p:cNvCxnSpPr>
+            <a:cxnSpLocks/>
+          </p:cNvCxnSpPr>
+          <p:nvPr/>
+        </p:nvCxnSpPr>
+        <p:spPr>
+          <a:xfrm flipV="1">
+            <a:off x="7006674" y="1374766"/>
+            <a:ext cx="0" cy="420574"/>
+          </a:xfrm>
+          <a:prstGeom prst="line">
+            <a:avLst/>
+          </a:prstGeom>
+        </p:spPr>
+        <p:style>
+          <a:lnRef idx="1">
+            <a:schemeClr val="accent1"/>
+          </a:lnRef>
+          <a:fillRef idx="0">
+            <a:schemeClr val="accent1"/>
+          </a:fillRef>
+          <a:effectRef idx="0">
+            <a:schemeClr val="accent1"/>
+          </a:effectRef>
+          <a:fontRef idx="minor">
+            <a:schemeClr val="tx1"/>
+          </a:fontRef>
+        </p:style>
+      </p:cxnSp>
+      <p:cxnSp>
+        <p:nvCxnSpPr>
+          <p:cNvPr id="52" name="Straight Connector 51">
+            <a:extLst>
+              <a:ext uri="{FF2B5EF4-FFF2-40B4-BE49-F238E27FC236}">
+                <a16:creationId xmlns:a16="http://schemas.microsoft.com/office/drawing/2014/main" id="{CDCA0322-D01D-45F5-AA9F-9DE2D18E0060}"/>
+              </a:ext>
+            </a:extLst>
+          </p:cNvPr>
+          <p:cNvCxnSpPr>
+            <a:cxnSpLocks/>
+          </p:cNvCxnSpPr>
+          <p:nvPr/>
+        </p:nvCxnSpPr>
+        <p:spPr>
+          <a:xfrm flipH="1" flipV="1">
+            <a:off x="3815181" y="1585054"/>
+            <a:ext cx="4766844" cy="0"/>
+          </a:xfrm>
+          <a:prstGeom prst="line">
+            <a:avLst/>
+          </a:prstGeom>
+        </p:spPr>
+        <p:style>
+          <a:lnRef idx="1">
+            <a:schemeClr val="accent1"/>
+          </a:lnRef>
+          <a:fillRef idx="0">
+            <a:schemeClr val="accent1"/>
+          </a:fillRef>
+          <a:effectRef idx="0">
+            <a:schemeClr val="accent1"/>
+          </a:effectRef>
+          <a:fontRef idx="minor">
+            <a:schemeClr val="tx1"/>
+          </a:fontRef>
+        </p:style>
+      </p:cxnSp>
+      <p:sp>
+        <p:nvSpPr>
+          <p:cNvPr id="55" name="TextBox 54">
+            <a:extLst>
+              <a:ext uri="{FF2B5EF4-FFF2-40B4-BE49-F238E27FC236}">
+                <a16:creationId xmlns:a16="http://schemas.microsoft.com/office/drawing/2014/main" id="{56604DDE-61EC-42DF-A8A7-105CAA68824B}"/>
+              </a:ext>
+            </a:extLst>
+          </p:cNvPr>
+          <p:cNvSpPr txBox="1"/>
+          <p:nvPr/>
+        </p:nvSpPr>
+        <p:spPr>
+          <a:xfrm>
+            <a:off x="4220890" y="1389778"/>
+            <a:ext cx="797107" cy="369332"/>
+          </a:xfrm>
+          <a:prstGeom prst="rect">
+            <a:avLst/>
+          </a:prstGeom>
+          <a:solidFill>
+            <a:schemeClr val="bg1"/>
+          </a:solidFill>
+        </p:spPr>
+        <p:txBody>
+          <a:bodyPr wrap="square" rtlCol="0">
+            <a:spAutoFit/>
+          </a:bodyPr>
+          <a:lstStyle/>
+          <a:p>
+            <a:pPr algn="ctr"/>
+            <a:r>
+              <a:rPr lang="en-US" dirty="0">
+                <a:solidFill>
+                  <a:srgbClr val="0070C0"/>
+                </a:solidFill>
+              </a:rPr>
+              <a:t>1 m</a:t>
+            </a:r>
+          </a:p>
+        </p:txBody>
+      </p:sp>
+      <p:sp>
+        <p:nvSpPr>
+          <p:cNvPr id="57" name="TextBox 56">
+            <a:extLst>
+              <a:ext uri="{FF2B5EF4-FFF2-40B4-BE49-F238E27FC236}">
+                <a16:creationId xmlns:a16="http://schemas.microsoft.com/office/drawing/2014/main" id="{B3A8914B-9FC1-4ADE-B1A2-4D0562CD6D32}"/>
+              </a:ext>
+            </a:extLst>
+          </p:cNvPr>
+          <p:cNvSpPr txBox="1"/>
+          <p:nvPr/>
+        </p:nvSpPr>
+        <p:spPr>
+          <a:xfrm>
+            <a:off x="5801132" y="1389778"/>
+            <a:ext cx="797107" cy="369332"/>
+          </a:xfrm>
+          <a:prstGeom prst="rect">
+            <a:avLst/>
+          </a:prstGeom>
+          <a:solidFill>
+            <a:schemeClr val="bg1"/>
+          </a:solidFill>
+        </p:spPr>
+        <p:txBody>
+          <a:bodyPr wrap="square" rtlCol="0">
+            <a:spAutoFit/>
+          </a:bodyPr>
+          <a:lstStyle/>
+          <a:p>
+            <a:pPr algn="ctr"/>
+            <a:r>
+              <a:rPr lang="en-US" dirty="0">
+                <a:solidFill>
+                  <a:srgbClr val="0070C0"/>
+                </a:solidFill>
+              </a:rPr>
+              <a:t>1 m</a:t>
+            </a:r>
+          </a:p>
+        </p:txBody>
+      </p:sp>
+      <p:sp>
+        <p:nvSpPr>
+          <p:cNvPr id="58" name="TextBox 57">
+            <a:extLst>
+              <a:ext uri="{FF2B5EF4-FFF2-40B4-BE49-F238E27FC236}">
+                <a16:creationId xmlns:a16="http://schemas.microsoft.com/office/drawing/2014/main" id="{07E0809B-65CA-4CAA-9F59-FA18C72CBA82}"/>
+              </a:ext>
+            </a:extLst>
+          </p:cNvPr>
+          <p:cNvSpPr txBox="1"/>
+          <p:nvPr/>
+        </p:nvSpPr>
+        <p:spPr>
+          <a:xfrm>
+            <a:off x="7513275" y="1389778"/>
+            <a:ext cx="797107" cy="369332"/>
+          </a:xfrm>
+          <a:prstGeom prst="rect">
+            <a:avLst/>
+          </a:prstGeom>
+          <a:solidFill>
+            <a:schemeClr val="bg1"/>
+          </a:solidFill>
+        </p:spPr>
+        <p:txBody>
+          <a:bodyPr wrap="square" rtlCol="0">
+            <a:spAutoFit/>
+          </a:bodyPr>
+          <a:lstStyle/>
+          <a:p>
+            <a:pPr algn="ctr"/>
+            <a:r>
+              <a:rPr lang="en-US" dirty="0">
+                <a:solidFill>
+                  <a:srgbClr val="0070C0"/>
+                </a:solidFill>
+              </a:rPr>
+              <a:t>1 m</a:t>
+            </a:r>
+          </a:p>
+        </p:txBody>
+      </p:sp>
+    </p:spTree>
+    <p:extLst>
+      <p:ext uri="{BB962C8B-B14F-4D97-AF65-F5344CB8AC3E}">
+        <p14:creationId xmlns:p14="http://schemas.microsoft.com/office/powerpoint/2010/main" val="50595199"/>
+      </p:ext>
+    </p:extLst>
+  </p:cSld>
+  <p:clrMapOvr>
+    <a:masterClrMapping/>
+  </p:clrMapOvr>
+</p:sld>
+</file>
+
+<file path=ppt/slides/slide13.xml><?xml version="1.0" encoding="utf-8"?>
+<p:sld xmlns:a="http://schemas.openxmlformats.org/drawingml/2006/main" xmlns:r="http://schemas.openxmlformats.org/officeDocument/2006/relationships" xmlns:p="http://schemas.openxmlformats.org/presentationml/2006/main">
+  <p:cSld>
+    <p:spTree>
+      <p:nvGrpSpPr>
+        <p:cNvPr id="1" name=""/>
+        <p:cNvGrpSpPr/>
+        <p:nvPr/>
+      </p:nvGrpSpPr>
+      <p:grpSpPr>
+        <a:xfrm>
+          <a:off x="0" y="0"/>
+          <a:ext cx="0" cy="0"/>
+          <a:chOff x="0" y="0"/>
+          <a:chExt cx="0" cy="0"/>
+        </a:xfrm>
+      </p:grpSpPr>
+      <p:sp>
+        <p:nvSpPr>
           <p:cNvPr id="2" name="Title 1"/>
           <p:cNvSpPr>
             <a:spLocks noGrp="1"/>
@@ -7751,13 +9728,13 @@
         <p:spPr/>
         <p:txBody>
           <a:bodyPr>
-            <a:normAutofit fontScale="90000"/>
+            <a:normAutofit/>
           </a:bodyPr>
           <a:lstStyle/>
           <a:p>
             <a:r>
               <a:rPr lang="en-US" dirty="0"/>
-              <a:t>Method of Joints (3D) Worked Example</a:t>
+              <a:t>Method of Joints Worked Example</a:t>
             </a:r>
           </a:p>
         </p:txBody>
@@ -7779,7 +9756,7 @@
           <a:p>
             <a:r>
               <a:rPr lang="en-US" dirty="0"/>
-              <a:t>Solve for the forces in each of the members.  Remember to specify tension or compression.</a:t>
+              <a:t>Use the method of joints to find the forces in all members of the truss shown to the right. Remember to specify tension or compression.</a:t>
             </a:r>
           </a:p>
         </p:txBody>
@@ -7829,6 +9806,1840 @@
     <p:extLst>
       <p:ext uri="{BB962C8B-B14F-4D97-AF65-F5344CB8AC3E}">
         <p14:creationId xmlns:p14="http://schemas.microsoft.com/office/powerpoint/2010/main" val="2561851710"/>
+      </p:ext>
+    </p:extLst>
+  </p:cSld>
+  <p:clrMapOvr>
+    <a:masterClrMapping/>
+  </p:clrMapOvr>
+</p:sld>
+</file>
+
+<file path=ppt/slides/slide14.xml><?xml version="1.0" encoding="utf-8"?>
+<p:sld xmlns:a="http://schemas.openxmlformats.org/drawingml/2006/main" xmlns:r="http://schemas.openxmlformats.org/officeDocument/2006/relationships" xmlns:p="http://schemas.openxmlformats.org/presentationml/2006/main">
+  <p:cSld>
+    <p:spTree>
+      <p:nvGrpSpPr>
+        <p:cNvPr id="1" name=""/>
+        <p:cNvGrpSpPr/>
+        <p:nvPr/>
+      </p:nvGrpSpPr>
+      <p:grpSpPr>
+        <a:xfrm>
+          <a:off x="0" y="0"/>
+          <a:ext cx="0" cy="0"/>
+          <a:chOff x="0" y="0"/>
+          <a:chExt cx="0" cy="0"/>
+        </a:xfrm>
+      </p:grpSpPr>
+      <p:cxnSp>
+        <p:nvCxnSpPr>
+          <p:cNvPr id="45" name="Straight Arrow Connector 44">
+            <a:extLst>
+              <a:ext uri="{FF2B5EF4-FFF2-40B4-BE49-F238E27FC236}">
+                <a16:creationId xmlns:a16="http://schemas.microsoft.com/office/drawing/2014/main" id="{76EE2EDF-4C99-4390-8572-E4A6DC18C4F1}"/>
+              </a:ext>
+            </a:extLst>
+          </p:cNvPr>
+          <p:cNvCxnSpPr/>
+          <p:nvPr/>
+        </p:nvCxnSpPr>
+        <p:spPr>
+          <a:xfrm>
+            <a:off x="7410449" y="2601004"/>
+            <a:ext cx="0" cy="951141"/>
+          </a:xfrm>
+          <a:prstGeom prst="straightConnector1">
+            <a:avLst/>
+          </a:prstGeom>
+          <a:ln>
+            <a:solidFill>
+              <a:srgbClr val="FF0000"/>
+            </a:solidFill>
+            <a:tailEnd type="arrow"/>
+          </a:ln>
+        </p:spPr>
+        <p:style>
+          <a:lnRef idx="2">
+            <a:schemeClr val="accent2"/>
+          </a:lnRef>
+          <a:fillRef idx="0">
+            <a:schemeClr val="accent2"/>
+          </a:fillRef>
+          <a:effectRef idx="1">
+            <a:schemeClr val="accent2"/>
+          </a:effectRef>
+          <a:fontRef idx="minor">
+            <a:schemeClr val="tx1"/>
+          </a:fontRef>
+        </p:style>
+      </p:cxnSp>
+      <p:sp>
+        <p:nvSpPr>
+          <p:cNvPr id="2" name="Title 1">
+            <a:extLst>
+              <a:ext uri="{FF2B5EF4-FFF2-40B4-BE49-F238E27FC236}">
+                <a16:creationId xmlns:a16="http://schemas.microsoft.com/office/drawing/2014/main" id="{B17E9E4A-0D4E-4538-BC6C-2A9D2B501A8C}"/>
+              </a:ext>
+            </a:extLst>
+          </p:cNvPr>
+          <p:cNvSpPr>
+            <a:spLocks noGrp="1"/>
+          </p:cNvSpPr>
+          <p:nvPr>
+            <p:ph type="title"/>
+          </p:nvPr>
+        </p:nvSpPr>
+        <p:spPr/>
+        <p:txBody>
+          <a:bodyPr>
+            <a:normAutofit/>
+          </a:bodyPr>
+          <a:lstStyle/>
+          <a:p>
+            <a:r>
+              <a:rPr lang="en-US" dirty="0"/>
+              <a:t>Method of Joints Worked Example</a:t>
+            </a:r>
+          </a:p>
+        </p:txBody>
+      </p:sp>
+      <p:sp>
+        <p:nvSpPr>
+          <p:cNvPr id="3" name="Content Placeholder 2">
+            <a:extLst>
+              <a:ext uri="{FF2B5EF4-FFF2-40B4-BE49-F238E27FC236}">
+                <a16:creationId xmlns:a16="http://schemas.microsoft.com/office/drawing/2014/main" id="{35F80A81-A496-4B02-BC6C-CCCAEF7F3996}"/>
+              </a:ext>
+            </a:extLst>
+          </p:cNvPr>
+          <p:cNvSpPr>
+            <a:spLocks noGrp="1"/>
+          </p:cNvSpPr>
+          <p:nvPr>
+            <p:ph idx="1"/>
+          </p:nvPr>
+        </p:nvSpPr>
+        <p:spPr>
+          <a:xfrm>
+            <a:off x="457199" y="1600200"/>
+            <a:ext cx="2743211" cy="4525963"/>
+          </a:xfrm>
+        </p:spPr>
+        <p:txBody>
+          <a:bodyPr>
+            <a:normAutofit fontScale="92500" lnSpcReduction="20000"/>
+          </a:bodyPr>
+          <a:lstStyle/>
+          <a:p>
+            <a:r>
+              <a:rPr lang="en-US" dirty="0"/>
+              <a:t>Use the method of joints to find the forces in all members of the truss shown to the right. Remember to specify tension or compression.</a:t>
+            </a:r>
+          </a:p>
+          <a:p>
+            <a:endParaRPr lang="en-US" dirty="0"/>
+          </a:p>
+        </p:txBody>
+      </p:sp>
+      <p:sp>
+        <p:nvSpPr>
+          <p:cNvPr id="4" name="Slide Number Placeholder 3">
+            <a:extLst>
+              <a:ext uri="{FF2B5EF4-FFF2-40B4-BE49-F238E27FC236}">
+                <a16:creationId xmlns:a16="http://schemas.microsoft.com/office/drawing/2014/main" id="{AC8C8FAC-64FC-45BE-902A-21B2BBDFB3D7}"/>
+              </a:ext>
+            </a:extLst>
+          </p:cNvPr>
+          <p:cNvSpPr>
+            <a:spLocks noGrp="1"/>
+          </p:cNvSpPr>
+          <p:nvPr>
+            <p:ph type="sldNum" sz="quarter" idx="12"/>
+          </p:nvPr>
+        </p:nvSpPr>
+        <p:spPr/>
+        <p:txBody>
+          <a:bodyPr/>
+          <a:lstStyle/>
+          <a:p>
+            <a:fld id="{929262FE-7F58-4A1E-8AF3-5A510A86DEBD}" type="slidenum">
+              <a:rPr lang="en-US" smtClean="0"/>
+              <a:t>14</a:t>
+            </a:fld>
+            <a:endParaRPr lang="en-US"/>
+          </a:p>
+        </p:txBody>
+      </p:sp>
+      <p:cxnSp>
+        <p:nvCxnSpPr>
+          <p:cNvPr id="6" name="Straight Connector 5">
+            <a:extLst>
+              <a:ext uri="{FF2B5EF4-FFF2-40B4-BE49-F238E27FC236}">
+                <a16:creationId xmlns:a16="http://schemas.microsoft.com/office/drawing/2014/main" id="{FC6A7337-59D8-4273-8548-236377C00E76}"/>
+              </a:ext>
+            </a:extLst>
+          </p:cNvPr>
+          <p:cNvCxnSpPr/>
+          <p:nvPr/>
+        </p:nvCxnSpPr>
+        <p:spPr>
+          <a:xfrm>
+            <a:off x="4686300" y="3238500"/>
+            <a:ext cx="0" cy="1828800"/>
+          </a:xfrm>
+          <a:prstGeom prst="line">
+            <a:avLst/>
+          </a:prstGeom>
+        </p:spPr>
+        <p:style>
+          <a:lnRef idx="3">
+            <a:schemeClr val="accent5"/>
+          </a:lnRef>
+          <a:fillRef idx="0">
+            <a:schemeClr val="accent5"/>
+          </a:fillRef>
+          <a:effectRef idx="2">
+            <a:schemeClr val="accent5"/>
+          </a:effectRef>
+          <a:fontRef idx="minor">
+            <a:schemeClr val="tx1"/>
+          </a:fontRef>
+        </p:style>
+      </p:cxnSp>
+      <p:cxnSp>
+        <p:nvCxnSpPr>
+          <p:cNvPr id="7" name="Straight Connector 6">
+            <a:extLst>
+              <a:ext uri="{FF2B5EF4-FFF2-40B4-BE49-F238E27FC236}">
+                <a16:creationId xmlns:a16="http://schemas.microsoft.com/office/drawing/2014/main" id="{1EF7E3DD-E8AC-4C4A-AA73-55A03EEBD07C}"/>
+              </a:ext>
+            </a:extLst>
+          </p:cNvPr>
+          <p:cNvCxnSpPr>
+            <a:cxnSpLocks/>
+          </p:cNvCxnSpPr>
+          <p:nvPr/>
+        </p:nvCxnSpPr>
+        <p:spPr>
+          <a:xfrm flipV="1">
+            <a:off x="4686300" y="2505869"/>
+            <a:ext cx="2743200" cy="685800"/>
+          </a:xfrm>
+          <a:prstGeom prst="line">
+            <a:avLst/>
+          </a:prstGeom>
+        </p:spPr>
+        <p:style>
+          <a:lnRef idx="3">
+            <a:schemeClr val="accent5"/>
+          </a:lnRef>
+          <a:fillRef idx="0">
+            <a:schemeClr val="accent5"/>
+          </a:fillRef>
+          <a:effectRef idx="2">
+            <a:schemeClr val="accent5"/>
+          </a:effectRef>
+          <a:fontRef idx="minor">
+            <a:schemeClr val="tx1"/>
+          </a:fontRef>
+        </p:style>
+      </p:cxnSp>
+      <p:cxnSp>
+        <p:nvCxnSpPr>
+          <p:cNvPr id="10" name="Straight Connector 9">
+            <a:extLst>
+              <a:ext uri="{FF2B5EF4-FFF2-40B4-BE49-F238E27FC236}">
+                <a16:creationId xmlns:a16="http://schemas.microsoft.com/office/drawing/2014/main" id="{26524A85-D6F5-466C-9917-4E8A47A40104}"/>
+              </a:ext>
+            </a:extLst>
+          </p:cNvPr>
+          <p:cNvCxnSpPr>
+            <a:cxnSpLocks/>
+          </p:cNvCxnSpPr>
+          <p:nvPr/>
+        </p:nvCxnSpPr>
+        <p:spPr>
+          <a:xfrm flipV="1">
+            <a:off x="4686300" y="4171950"/>
+            <a:ext cx="3657600" cy="914400"/>
+          </a:xfrm>
+          <a:prstGeom prst="line">
+            <a:avLst/>
+          </a:prstGeom>
+          <a:ln w="9525" cap="flat" cmpd="sng" algn="ctr">
+            <a:solidFill>
+              <a:schemeClr val="dk1"/>
+            </a:solidFill>
+            <a:prstDash val="dash"/>
+            <a:round/>
+            <a:headEnd type="none" w="med" len="med"/>
+            <a:tailEnd type="arrow" w="med" len="med"/>
+          </a:ln>
+        </p:spPr>
+        <p:style>
+          <a:lnRef idx="0">
+            <a:scrgbClr r="0" g="0" b="0"/>
+          </a:lnRef>
+          <a:fillRef idx="0">
+            <a:scrgbClr r="0" g="0" b="0"/>
+          </a:fillRef>
+          <a:effectRef idx="0">
+            <a:scrgbClr r="0" g="0" b="0"/>
+          </a:effectRef>
+          <a:fontRef idx="minor">
+            <a:schemeClr val="tx1"/>
+          </a:fontRef>
+        </p:style>
+      </p:cxnSp>
+      <p:cxnSp>
+        <p:nvCxnSpPr>
+          <p:cNvPr id="14" name="Straight Connector 13">
+            <a:extLst>
+              <a:ext uri="{FF2B5EF4-FFF2-40B4-BE49-F238E27FC236}">
+                <a16:creationId xmlns:a16="http://schemas.microsoft.com/office/drawing/2014/main" id="{E589443D-7335-4D91-98EE-1847E4D58751}"/>
+              </a:ext>
+            </a:extLst>
+          </p:cNvPr>
+          <p:cNvCxnSpPr>
+            <a:cxnSpLocks/>
+          </p:cNvCxnSpPr>
+          <p:nvPr/>
+        </p:nvCxnSpPr>
+        <p:spPr>
+          <a:xfrm>
+            <a:off x="4686300" y="3205163"/>
+            <a:ext cx="685800" cy="1050988"/>
+          </a:xfrm>
+          <a:prstGeom prst="line">
+            <a:avLst/>
+          </a:prstGeom>
+        </p:spPr>
+        <p:style>
+          <a:lnRef idx="3">
+            <a:schemeClr val="accent5"/>
+          </a:lnRef>
+          <a:fillRef idx="0">
+            <a:schemeClr val="accent5"/>
+          </a:fillRef>
+          <a:effectRef idx="2">
+            <a:schemeClr val="accent5"/>
+          </a:effectRef>
+          <a:fontRef idx="minor">
+            <a:schemeClr val="tx1"/>
+          </a:fontRef>
+        </p:style>
+      </p:cxnSp>
+      <p:cxnSp>
+        <p:nvCxnSpPr>
+          <p:cNvPr id="17" name="Straight Connector 16">
+            <a:extLst>
+              <a:ext uri="{FF2B5EF4-FFF2-40B4-BE49-F238E27FC236}">
+                <a16:creationId xmlns:a16="http://schemas.microsoft.com/office/drawing/2014/main" id="{037BA619-1F04-4F1C-862A-0E4756F832AD}"/>
+              </a:ext>
+            </a:extLst>
+          </p:cNvPr>
+          <p:cNvCxnSpPr>
+            <a:cxnSpLocks/>
+          </p:cNvCxnSpPr>
+          <p:nvPr/>
+        </p:nvCxnSpPr>
+        <p:spPr>
+          <a:xfrm flipH="1">
+            <a:off x="5372100" y="2505869"/>
+            <a:ext cx="2057400" cy="1761886"/>
+          </a:xfrm>
+          <a:prstGeom prst="line">
+            <a:avLst/>
+          </a:prstGeom>
+        </p:spPr>
+        <p:style>
+          <a:lnRef idx="3">
+            <a:schemeClr val="accent5"/>
+          </a:lnRef>
+          <a:fillRef idx="0">
+            <a:schemeClr val="accent5"/>
+          </a:fillRef>
+          <a:effectRef idx="2">
+            <a:schemeClr val="accent5"/>
+          </a:effectRef>
+          <a:fontRef idx="minor">
+            <a:schemeClr val="tx1"/>
+          </a:fontRef>
+        </p:style>
+      </p:cxnSp>
+      <p:cxnSp>
+        <p:nvCxnSpPr>
+          <p:cNvPr id="24" name="Straight Connector 23">
+            <a:extLst>
+              <a:ext uri="{FF2B5EF4-FFF2-40B4-BE49-F238E27FC236}">
+                <a16:creationId xmlns:a16="http://schemas.microsoft.com/office/drawing/2014/main" id="{FBCC122D-246A-4058-832E-9B6355860733}"/>
+              </a:ext>
+            </a:extLst>
+          </p:cNvPr>
+          <p:cNvCxnSpPr>
+            <a:cxnSpLocks/>
+          </p:cNvCxnSpPr>
+          <p:nvPr/>
+        </p:nvCxnSpPr>
+        <p:spPr>
+          <a:xfrm flipH="1">
+            <a:off x="6743700" y="2529276"/>
+            <a:ext cx="685799" cy="2629671"/>
+          </a:xfrm>
+          <a:prstGeom prst="line">
+            <a:avLst/>
+          </a:prstGeom>
+        </p:spPr>
+        <p:style>
+          <a:lnRef idx="3">
+            <a:schemeClr val="accent5"/>
+          </a:lnRef>
+          <a:fillRef idx="0">
+            <a:schemeClr val="accent5"/>
+          </a:fillRef>
+          <a:effectRef idx="2">
+            <a:schemeClr val="accent5"/>
+          </a:effectRef>
+          <a:fontRef idx="minor">
+            <a:schemeClr val="tx1"/>
+          </a:fontRef>
+        </p:style>
+      </p:cxnSp>
+      <p:sp>
+        <p:nvSpPr>
+          <p:cNvPr id="27" name="Rectangle 26">
+            <a:extLst>
+              <a:ext uri="{FF2B5EF4-FFF2-40B4-BE49-F238E27FC236}">
+                <a16:creationId xmlns:a16="http://schemas.microsoft.com/office/drawing/2014/main" id="{185E5501-13DD-4361-BDB5-9EE263CB4976}"/>
+              </a:ext>
+            </a:extLst>
+          </p:cNvPr>
+          <p:cNvSpPr/>
+          <p:nvPr/>
+        </p:nvSpPr>
+        <p:spPr>
+          <a:xfrm rot="18973827">
+            <a:off x="5511818" y="3915052"/>
+            <a:ext cx="182880" cy="290576"/>
+          </a:xfrm>
+          <a:prstGeom prst="rect">
+            <a:avLst/>
+          </a:prstGeom>
+          <a:solidFill>
+            <a:schemeClr val="bg1"/>
+          </a:solidFill>
+          <a:ln>
+            <a:noFill/>
+          </a:ln>
+        </p:spPr>
+        <p:style>
+          <a:lnRef idx="2">
+            <a:schemeClr val="accent1">
+              <a:shade val="50000"/>
+            </a:schemeClr>
+          </a:lnRef>
+          <a:fillRef idx="1">
+            <a:schemeClr val="accent1"/>
+          </a:fillRef>
+          <a:effectRef idx="0">
+            <a:schemeClr val="accent1"/>
+          </a:effectRef>
+          <a:fontRef idx="minor">
+            <a:schemeClr val="lt1"/>
+          </a:fontRef>
+        </p:style>
+        <p:txBody>
+          <a:bodyPr rtlCol="0" anchor="ctr"/>
+          <a:lstStyle/>
+          <a:p>
+            <a:pPr algn="ctr"/>
+            <a:endParaRPr lang="en-US"/>
+          </a:p>
+        </p:txBody>
+      </p:sp>
+      <p:cxnSp>
+        <p:nvCxnSpPr>
+          <p:cNvPr id="22" name="Straight Connector 21">
+            <a:extLst>
+              <a:ext uri="{FF2B5EF4-FFF2-40B4-BE49-F238E27FC236}">
+                <a16:creationId xmlns:a16="http://schemas.microsoft.com/office/drawing/2014/main" id="{1195009E-7EE4-42C9-8D63-7DFBF40E9D7B}"/>
+              </a:ext>
+            </a:extLst>
+          </p:cNvPr>
+          <p:cNvCxnSpPr>
+            <a:cxnSpLocks/>
+          </p:cNvCxnSpPr>
+          <p:nvPr/>
+        </p:nvCxnSpPr>
+        <p:spPr>
+          <a:xfrm>
+            <a:off x="4686300" y="3190875"/>
+            <a:ext cx="2057400" cy="1936655"/>
+          </a:xfrm>
+          <a:prstGeom prst="line">
+            <a:avLst/>
+          </a:prstGeom>
+        </p:spPr>
+        <p:style>
+          <a:lnRef idx="3">
+            <a:schemeClr val="accent5"/>
+          </a:lnRef>
+          <a:fillRef idx="0">
+            <a:schemeClr val="accent5"/>
+          </a:fillRef>
+          <a:effectRef idx="2">
+            <a:schemeClr val="accent5"/>
+          </a:effectRef>
+          <a:fontRef idx="minor">
+            <a:schemeClr val="tx1"/>
+          </a:fontRef>
+        </p:style>
+      </p:cxnSp>
+      <p:cxnSp>
+        <p:nvCxnSpPr>
+          <p:cNvPr id="29" name="Straight Connector 28">
+            <a:extLst>
+              <a:ext uri="{FF2B5EF4-FFF2-40B4-BE49-F238E27FC236}">
+                <a16:creationId xmlns:a16="http://schemas.microsoft.com/office/drawing/2014/main" id="{DAFF9594-9642-4F69-A04D-BB7467AE17CF}"/>
+              </a:ext>
+            </a:extLst>
+          </p:cNvPr>
+          <p:cNvCxnSpPr>
+            <a:cxnSpLocks/>
+          </p:cNvCxnSpPr>
+          <p:nvPr/>
+        </p:nvCxnSpPr>
+        <p:spPr>
+          <a:xfrm>
+            <a:off x="5334000" y="4236180"/>
+            <a:ext cx="1370694" cy="886078"/>
+          </a:xfrm>
+          <a:prstGeom prst="line">
+            <a:avLst/>
+          </a:prstGeom>
+          <a:ln w="9525" cap="flat" cmpd="sng" algn="ctr">
+            <a:solidFill>
+              <a:schemeClr val="dk1"/>
+            </a:solidFill>
+            <a:prstDash val="dash"/>
+            <a:round/>
+            <a:headEnd type="none" w="med" len="med"/>
+            <a:tailEnd type="none" w="med" len="med"/>
+          </a:ln>
+        </p:spPr>
+        <p:style>
+          <a:lnRef idx="0">
+            <a:scrgbClr r="0" g="0" b="0"/>
+          </a:lnRef>
+          <a:fillRef idx="0">
+            <a:scrgbClr r="0" g="0" b="0"/>
+          </a:fillRef>
+          <a:effectRef idx="0">
+            <a:scrgbClr r="0" g="0" b="0"/>
+          </a:effectRef>
+          <a:fontRef idx="minor">
+            <a:schemeClr val="tx1"/>
+          </a:fontRef>
+        </p:style>
+      </p:cxnSp>
+      <p:cxnSp>
+        <p:nvCxnSpPr>
+          <p:cNvPr id="31" name="Straight Connector 30">
+            <a:extLst>
+              <a:ext uri="{FF2B5EF4-FFF2-40B4-BE49-F238E27FC236}">
+                <a16:creationId xmlns:a16="http://schemas.microsoft.com/office/drawing/2014/main" id="{24CE66B7-78B3-44E4-8921-A2830CBA23BB}"/>
+              </a:ext>
+            </a:extLst>
+          </p:cNvPr>
+          <p:cNvCxnSpPr>
+            <a:cxnSpLocks/>
+          </p:cNvCxnSpPr>
+          <p:nvPr/>
+        </p:nvCxnSpPr>
+        <p:spPr>
+          <a:xfrm>
+            <a:off x="6871690" y="5215777"/>
+            <a:ext cx="561620" cy="355762"/>
+          </a:xfrm>
+          <a:prstGeom prst="line">
+            <a:avLst/>
+          </a:prstGeom>
+          <a:ln w="9525" cap="flat" cmpd="sng" algn="ctr">
+            <a:solidFill>
+              <a:schemeClr val="dk1"/>
+            </a:solidFill>
+            <a:prstDash val="dash"/>
+            <a:round/>
+            <a:headEnd type="none" w="med" len="med"/>
+            <a:tailEnd type="arrow" w="med" len="med"/>
+          </a:ln>
+        </p:spPr>
+        <p:style>
+          <a:lnRef idx="0">
+            <a:scrgbClr r="0" g="0" b="0"/>
+          </a:lnRef>
+          <a:fillRef idx="0">
+            <a:scrgbClr r="0" g="0" b="0"/>
+          </a:fillRef>
+          <a:effectRef idx="0">
+            <a:scrgbClr r="0" g="0" b="0"/>
+          </a:effectRef>
+          <a:fontRef idx="minor">
+            <a:schemeClr val="tx1"/>
+          </a:fontRef>
+        </p:style>
+      </p:cxnSp>
+      <p:cxnSp>
+        <p:nvCxnSpPr>
+          <p:cNvPr id="35" name="Straight Connector 34">
+            <a:extLst>
+              <a:ext uri="{FF2B5EF4-FFF2-40B4-BE49-F238E27FC236}">
+                <a16:creationId xmlns:a16="http://schemas.microsoft.com/office/drawing/2014/main" id="{5BF2217A-1F2E-4066-8784-65BF8A09A986}"/>
+              </a:ext>
+            </a:extLst>
+          </p:cNvPr>
+          <p:cNvCxnSpPr>
+            <a:cxnSpLocks/>
+          </p:cNvCxnSpPr>
+          <p:nvPr/>
+        </p:nvCxnSpPr>
+        <p:spPr>
+          <a:xfrm flipV="1">
+            <a:off x="4686299" y="2200275"/>
+            <a:ext cx="0" cy="951945"/>
+          </a:xfrm>
+          <a:prstGeom prst="line">
+            <a:avLst/>
+          </a:prstGeom>
+          <a:ln w="9525" cap="flat" cmpd="sng" algn="ctr">
+            <a:solidFill>
+              <a:schemeClr val="dk1"/>
+            </a:solidFill>
+            <a:prstDash val="dash"/>
+            <a:round/>
+            <a:headEnd type="none" w="med" len="med"/>
+            <a:tailEnd type="arrow" w="med" len="med"/>
+          </a:ln>
+        </p:spPr>
+        <p:style>
+          <a:lnRef idx="0">
+            <a:scrgbClr r="0" g="0" b="0"/>
+          </a:lnRef>
+          <a:fillRef idx="0">
+            <a:scrgbClr r="0" g="0" b="0"/>
+          </a:fillRef>
+          <a:effectRef idx="0">
+            <a:scrgbClr r="0" g="0" b="0"/>
+          </a:effectRef>
+          <a:fontRef idx="minor">
+            <a:schemeClr val="tx1"/>
+          </a:fontRef>
+        </p:style>
+      </p:cxnSp>
+      <p:sp>
+        <p:nvSpPr>
+          <p:cNvPr id="37" name="Isosceles Triangle 36">
+            <a:extLst>
+              <a:ext uri="{FF2B5EF4-FFF2-40B4-BE49-F238E27FC236}">
+                <a16:creationId xmlns:a16="http://schemas.microsoft.com/office/drawing/2014/main" id="{92666337-A899-4D38-B886-BE59B55DD5EC}"/>
+              </a:ext>
+            </a:extLst>
+          </p:cNvPr>
+          <p:cNvSpPr/>
+          <p:nvPr/>
+        </p:nvSpPr>
+        <p:spPr>
+          <a:xfrm>
+            <a:off x="4572603" y="5064509"/>
+            <a:ext cx="228600" cy="274320"/>
+          </a:xfrm>
+          <a:prstGeom prst="triangle">
+            <a:avLst/>
+          </a:prstGeom>
+        </p:spPr>
+        <p:style>
+          <a:lnRef idx="2">
+            <a:schemeClr val="accent5">
+              <a:shade val="50000"/>
+            </a:schemeClr>
+          </a:lnRef>
+          <a:fillRef idx="1">
+            <a:schemeClr val="accent5"/>
+          </a:fillRef>
+          <a:effectRef idx="0">
+            <a:schemeClr val="accent5"/>
+          </a:effectRef>
+          <a:fontRef idx="minor">
+            <a:schemeClr val="lt1"/>
+          </a:fontRef>
+        </p:style>
+        <p:txBody>
+          <a:bodyPr rtlCol="0" anchor="ctr"/>
+          <a:lstStyle/>
+          <a:p>
+            <a:pPr algn="ctr"/>
+            <a:endParaRPr lang="en-US"/>
+          </a:p>
+        </p:txBody>
+      </p:sp>
+      <p:sp>
+        <p:nvSpPr>
+          <p:cNvPr id="38" name="Isosceles Triangle 37">
+            <a:extLst>
+              <a:ext uri="{FF2B5EF4-FFF2-40B4-BE49-F238E27FC236}">
+                <a16:creationId xmlns:a16="http://schemas.microsoft.com/office/drawing/2014/main" id="{F8C6A607-D83E-496F-A076-4873BDA2C95E}"/>
+              </a:ext>
+            </a:extLst>
+          </p:cNvPr>
+          <p:cNvSpPr/>
+          <p:nvPr/>
+        </p:nvSpPr>
+        <p:spPr>
+          <a:xfrm>
+            <a:off x="6630004" y="5122258"/>
+            <a:ext cx="228600" cy="274320"/>
+          </a:xfrm>
+          <a:prstGeom prst="triangle">
+            <a:avLst/>
+          </a:prstGeom>
+        </p:spPr>
+        <p:style>
+          <a:lnRef idx="2">
+            <a:schemeClr val="accent5">
+              <a:shade val="50000"/>
+            </a:schemeClr>
+          </a:lnRef>
+          <a:fillRef idx="1">
+            <a:schemeClr val="accent5"/>
+          </a:fillRef>
+          <a:effectRef idx="0">
+            <a:schemeClr val="accent5"/>
+          </a:effectRef>
+          <a:fontRef idx="minor">
+            <a:schemeClr val="lt1"/>
+          </a:fontRef>
+        </p:style>
+        <p:txBody>
+          <a:bodyPr rtlCol="0" anchor="ctr"/>
+          <a:lstStyle/>
+          <a:p>
+            <a:pPr algn="ctr"/>
+            <a:endParaRPr lang="en-US"/>
+          </a:p>
+        </p:txBody>
+      </p:sp>
+      <p:sp>
+        <p:nvSpPr>
+          <p:cNvPr id="39" name="Isosceles Triangle 38">
+            <a:extLst>
+              <a:ext uri="{FF2B5EF4-FFF2-40B4-BE49-F238E27FC236}">
+                <a16:creationId xmlns:a16="http://schemas.microsoft.com/office/drawing/2014/main" id="{EB483ED2-73F4-4793-A01D-AB1B1A0DC3FE}"/>
+              </a:ext>
+            </a:extLst>
+          </p:cNvPr>
+          <p:cNvSpPr/>
+          <p:nvPr/>
+        </p:nvSpPr>
+        <p:spPr>
+          <a:xfrm>
+            <a:off x="5258706" y="4264755"/>
+            <a:ext cx="228600" cy="274320"/>
+          </a:xfrm>
+          <a:prstGeom prst="triangle">
+            <a:avLst/>
+          </a:prstGeom>
+        </p:spPr>
+        <p:style>
+          <a:lnRef idx="2">
+            <a:schemeClr val="accent5">
+              <a:shade val="50000"/>
+            </a:schemeClr>
+          </a:lnRef>
+          <a:fillRef idx="1">
+            <a:schemeClr val="accent5"/>
+          </a:fillRef>
+          <a:effectRef idx="0">
+            <a:schemeClr val="accent5"/>
+          </a:effectRef>
+          <a:fontRef idx="minor">
+            <a:schemeClr val="lt1"/>
+          </a:fontRef>
+        </p:style>
+        <p:txBody>
+          <a:bodyPr rtlCol="0" anchor="ctr"/>
+          <a:lstStyle/>
+          <a:p>
+            <a:pPr algn="ctr"/>
+            <a:endParaRPr lang="en-US"/>
+          </a:p>
+        </p:txBody>
+      </p:sp>
+      <p:sp>
+        <p:nvSpPr>
+          <p:cNvPr id="40" name="Oval 39">
+            <a:extLst>
+              <a:ext uri="{FF2B5EF4-FFF2-40B4-BE49-F238E27FC236}">
+                <a16:creationId xmlns:a16="http://schemas.microsoft.com/office/drawing/2014/main" id="{1B4E4D1C-A411-4A6A-A722-5BFAF909DC0F}"/>
+              </a:ext>
+            </a:extLst>
+          </p:cNvPr>
+          <p:cNvSpPr/>
+          <p:nvPr/>
+        </p:nvSpPr>
+        <p:spPr>
+          <a:xfrm>
+            <a:off x="4617720" y="3142741"/>
+            <a:ext cx="137160" cy="137160"/>
+          </a:xfrm>
+          <a:prstGeom prst="ellipse">
+            <a:avLst/>
+          </a:prstGeom>
+        </p:spPr>
+        <p:style>
+          <a:lnRef idx="2">
+            <a:schemeClr val="dk1">
+              <a:shade val="50000"/>
+            </a:schemeClr>
+          </a:lnRef>
+          <a:fillRef idx="1">
+            <a:schemeClr val="dk1"/>
+          </a:fillRef>
+          <a:effectRef idx="0">
+            <a:schemeClr val="dk1"/>
+          </a:effectRef>
+          <a:fontRef idx="minor">
+            <a:schemeClr val="lt1"/>
+          </a:fontRef>
+        </p:style>
+        <p:txBody>
+          <a:bodyPr rtlCol="0" anchor="ctr"/>
+          <a:lstStyle/>
+          <a:p>
+            <a:pPr algn="ctr"/>
+            <a:endParaRPr lang="en-US"/>
+          </a:p>
+        </p:txBody>
+      </p:sp>
+      <p:sp>
+        <p:nvSpPr>
+          <p:cNvPr id="41" name="Oval 40">
+            <a:extLst>
+              <a:ext uri="{FF2B5EF4-FFF2-40B4-BE49-F238E27FC236}">
+                <a16:creationId xmlns:a16="http://schemas.microsoft.com/office/drawing/2014/main" id="{50F501AF-4179-43A4-B151-FC14211809C2}"/>
+              </a:ext>
+            </a:extLst>
+          </p:cNvPr>
+          <p:cNvSpPr/>
+          <p:nvPr/>
+        </p:nvSpPr>
+        <p:spPr>
+          <a:xfrm>
+            <a:off x="5311140" y="4168140"/>
+            <a:ext cx="137160" cy="137160"/>
+          </a:xfrm>
+          <a:prstGeom prst="ellipse">
+            <a:avLst/>
+          </a:prstGeom>
+        </p:spPr>
+        <p:style>
+          <a:lnRef idx="2">
+            <a:schemeClr val="dk1">
+              <a:shade val="50000"/>
+            </a:schemeClr>
+          </a:lnRef>
+          <a:fillRef idx="1">
+            <a:schemeClr val="dk1"/>
+          </a:fillRef>
+          <a:effectRef idx="0">
+            <a:schemeClr val="dk1"/>
+          </a:effectRef>
+          <a:fontRef idx="minor">
+            <a:schemeClr val="lt1"/>
+          </a:fontRef>
+        </p:style>
+        <p:txBody>
+          <a:bodyPr rtlCol="0" anchor="ctr"/>
+          <a:lstStyle/>
+          <a:p>
+            <a:pPr algn="ctr"/>
+            <a:endParaRPr lang="en-US"/>
+          </a:p>
+        </p:txBody>
+      </p:sp>
+      <p:sp>
+        <p:nvSpPr>
+          <p:cNvPr id="42" name="Oval 41">
+            <a:extLst>
+              <a:ext uri="{FF2B5EF4-FFF2-40B4-BE49-F238E27FC236}">
+                <a16:creationId xmlns:a16="http://schemas.microsoft.com/office/drawing/2014/main" id="{AC1C127E-106A-459E-87C8-5F49E386B5EE}"/>
+              </a:ext>
+            </a:extLst>
+          </p:cNvPr>
+          <p:cNvSpPr/>
+          <p:nvPr/>
+        </p:nvSpPr>
+        <p:spPr>
+          <a:xfrm>
+            <a:off x="6677025" y="5034915"/>
+            <a:ext cx="137160" cy="137160"/>
+          </a:xfrm>
+          <a:prstGeom prst="ellipse">
+            <a:avLst/>
+          </a:prstGeom>
+        </p:spPr>
+        <p:style>
+          <a:lnRef idx="2">
+            <a:schemeClr val="dk1">
+              <a:shade val="50000"/>
+            </a:schemeClr>
+          </a:lnRef>
+          <a:fillRef idx="1">
+            <a:schemeClr val="dk1"/>
+          </a:fillRef>
+          <a:effectRef idx="0">
+            <a:schemeClr val="dk1"/>
+          </a:effectRef>
+          <a:fontRef idx="minor">
+            <a:schemeClr val="lt1"/>
+          </a:fontRef>
+        </p:style>
+        <p:txBody>
+          <a:bodyPr rtlCol="0" anchor="ctr"/>
+          <a:lstStyle/>
+          <a:p>
+            <a:pPr algn="ctr"/>
+            <a:endParaRPr lang="en-US"/>
+          </a:p>
+        </p:txBody>
+      </p:sp>
+      <p:sp>
+        <p:nvSpPr>
+          <p:cNvPr id="43" name="Oval 42">
+            <a:extLst>
+              <a:ext uri="{FF2B5EF4-FFF2-40B4-BE49-F238E27FC236}">
+                <a16:creationId xmlns:a16="http://schemas.microsoft.com/office/drawing/2014/main" id="{03E47F0E-AB0D-4B54-A97C-22FFF2A6D533}"/>
+              </a:ext>
+            </a:extLst>
+          </p:cNvPr>
+          <p:cNvSpPr/>
+          <p:nvPr/>
+        </p:nvSpPr>
+        <p:spPr>
+          <a:xfrm>
+            <a:off x="7334250" y="2482215"/>
+            <a:ext cx="137160" cy="137160"/>
+          </a:xfrm>
+          <a:prstGeom prst="ellipse">
+            <a:avLst/>
+          </a:prstGeom>
+        </p:spPr>
+        <p:style>
+          <a:lnRef idx="2">
+            <a:schemeClr val="dk1">
+              <a:shade val="50000"/>
+            </a:schemeClr>
+          </a:lnRef>
+          <a:fillRef idx="1">
+            <a:schemeClr val="dk1"/>
+          </a:fillRef>
+          <a:effectRef idx="0">
+            <a:schemeClr val="dk1"/>
+          </a:effectRef>
+          <a:fontRef idx="minor">
+            <a:schemeClr val="lt1"/>
+          </a:fontRef>
+        </p:style>
+        <p:txBody>
+          <a:bodyPr rtlCol="0" anchor="ctr"/>
+          <a:lstStyle/>
+          <a:p>
+            <a:pPr algn="ctr"/>
+            <a:endParaRPr lang="en-US"/>
+          </a:p>
+        </p:txBody>
+      </p:sp>
+      <p:sp>
+        <p:nvSpPr>
+          <p:cNvPr id="44" name="Oval 43">
+            <a:extLst>
+              <a:ext uri="{FF2B5EF4-FFF2-40B4-BE49-F238E27FC236}">
+                <a16:creationId xmlns:a16="http://schemas.microsoft.com/office/drawing/2014/main" id="{AD691740-ACF2-4642-BC23-2EA100E9D100}"/>
+              </a:ext>
+            </a:extLst>
+          </p:cNvPr>
+          <p:cNvSpPr/>
+          <p:nvPr/>
+        </p:nvSpPr>
+        <p:spPr>
+          <a:xfrm>
+            <a:off x="4615815" y="5019675"/>
+            <a:ext cx="137160" cy="137160"/>
+          </a:xfrm>
+          <a:prstGeom prst="ellipse">
+            <a:avLst/>
+          </a:prstGeom>
+        </p:spPr>
+        <p:style>
+          <a:lnRef idx="2">
+            <a:schemeClr val="dk1">
+              <a:shade val="50000"/>
+            </a:schemeClr>
+          </a:lnRef>
+          <a:fillRef idx="1">
+            <a:schemeClr val="dk1"/>
+          </a:fillRef>
+          <a:effectRef idx="0">
+            <a:schemeClr val="dk1"/>
+          </a:effectRef>
+          <a:fontRef idx="minor">
+            <a:schemeClr val="lt1"/>
+          </a:fontRef>
+        </p:style>
+        <p:txBody>
+          <a:bodyPr rtlCol="0" anchor="ctr"/>
+          <a:lstStyle/>
+          <a:p>
+            <a:pPr algn="ctr"/>
+            <a:endParaRPr lang="en-US"/>
+          </a:p>
+        </p:txBody>
+      </p:sp>
+      <p:sp>
+        <p:nvSpPr>
+          <p:cNvPr id="46" name="TextBox 45">
+            <a:extLst>
+              <a:ext uri="{FF2B5EF4-FFF2-40B4-BE49-F238E27FC236}">
+                <a16:creationId xmlns:a16="http://schemas.microsoft.com/office/drawing/2014/main" id="{BFCB56E9-A754-4395-9B71-56D4C3130F90}"/>
+              </a:ext>
+            </a:extLst>
+          </p:cNvPr>
+          <p:cNvSpPr txBox="1"/>
+          <p:nvPr/>
+        </p:nvSpPr>
+        <p:spPr>
+          <a:xfrm>
+            <a:off x="7112819" y="3614808"/>
+            <a:ext cx="685800" cy="369332"/>
+          </a:xfrm>
+          <a:prstGeom prst="rect">
+            <a:avLst/>
+          </a:prstGeom>
+          <a:noFill/>
+        </p:spPr>
+        <p:txBody>
+          <a:bodyPr wrap="square" rtlCol="0">
+            <a:spAutoFit/>
+          </a:bodyPr>
+          <a:lstStyle/>
+          <a:p>
+            <a:r>
+              <a:rPr lang="en-US" dirty="0">
+                <a:solidFill>
+                  <a:srgbClr val="FF0000"/>
+                </a:solidFill>
+              </a:rPr>
+              <a:t>2 kN</a:t>
+            </a:r>
+          </a:p>
+        </p:txBody>
+      </p:sp>
+      <p:cxnSp>
+        <p:nvCxnSpPr>
+          <p:cNvPr id="48" name="Straight Connector 47">
+            <a:extLst>
+              <a:ext uri="{FF2B5EF4-FFF2-40B4-BE49-F238E27FC236}">
+                <a16:creationId xmlns:a16="http://schemas.microsoft.com/office/drawing/2014/main" id="{D0E6F442-47A6-4A6C-8B46-4F5202CDA10C}"/>
+              </a:ext>
+            </a:extLst>
+          </p:cNvPr>
+          <p:cNvCxnSpPr/>
+          <p:nvPr/>
+        </p:nvCxnSpPr>
+        <p:spPr>
+          <a:xfrm flipV="1">
+            <a:off x="7402830" y="1905000"/>
+            <a:ext cx="0" cy="381000"/>
+          </a:xfrm>
+          <a:prstGeom prst="line">
+            <a:avLst/>
+          </a:prstGeom>
+        </p:spPr>
+        <p:style>
+          <a:lnRef idx="1">
+            <a:schemeClr val="accent1"/>
+          </a:lnRef>
+          <a:fillRef idx="0">
+            <a:schemeClr val="accent1"/>
+          </a:fillRef>
+          <a:effectRef idx="0">
+            <a:schemeClr val="accent1"/>
+          </a:effectRef>
+          <a:fontRef idx="minor">
+            <a:schemeClr val="tx1"/>
+          </a:fontRef>
+        </p:style>
+      </p:cxnSp>
+      <p:cxnSp>
+        <p:nvCxnSpPr>
+          <p:cNvPr id="49" name="Straight Connector 48">
+            <a:extLst>
+              <a:ext uri="{FF2B5EF4-FFF2-40B4-BE49-F238E27FC236}">
+                <a16:creationId xmlns:a16="http://schemas.microsoft.com/office/drawing/2014/main" id="{553DCB06-AB7F-45C2-91C8-6844DDD768AC}"/>
+              </a:ext>
+            </a:extLst>
+          </p:cNvPr>
+          <p:cNvCxnSpPr>
+            <a:cxnSpLocks/>
+          </p:cNvCxnSpPr>
+          <p:nvPr/>
+        </p:nvCxnSpPr>
+        <p:spPr>
+          <a:xfrm flipH="1">
+            <a:off x="4684396" y="2082730"/>
+            <a:ext cx="2718434" cy="644596"/>
+          </a:xfrm>
+          <a:prstGeom prst="line">
+            <a:avLst/>
+          </a:prstGeom>
+        </p:spPr>
+        <p:style>
+          <a:lnRef idx="1">
+            <a:schemeClr val="accent1"/>
+          </a:lnRef>
+          <a:fillRef idx="0">
+            <a:schemeClr val="accent1"/>
+          </a:fillRef>
+          <a:effectRef idx="0">
+            <a:schemeClr val="accent1"/>
+          </a:effectRef>
+          <a:fontRef idx="minor">
+            <a:schemeClr val="tx1"/>
+          </a:fontRef>
+        </p:style>
+      </p:cxnSp>
+      <p:cxnSp>
+        <p:nvCxnSpPr>
+          <p:cNvPr id="54" name="Straight Connector 53">
+            <a:extLst>
+              <a:ext uri="{FF2B5EF4-FFF2-40B4-BE49-F238E27FC236}">
+                <a16:creationId xmlns:a16="http://schemas.microsoft.com/office/drawing/2014/main" id="{A15391E1-B990-4B31-8624-838B3BE6B0FD}"/>
+              </a:ext>
+            </a:extLst>
+          </p:cNvPr>
+          <p:cNvCxnSpPr>
+            <a:cxnSpLocks/>
+          </p:cNvCxnSpPr>
+          <p:nvPr/>
+        </p:nvCxnSpPr>
+        <p:spPr>
+          <a:xfrm flipV="1">
+            <a:off x="3924300" y="5133975"/>
+            <a:ext cx="548640" cy="137160"/>
+          </a:xfrm>
+          <a:prstGeom prst="line">
+            <a:avLst/>
+          </a:prstGeom>
+        </p:spPr>
+        <p:style>
+          <a:lnRef idx="1">
+            <a:schemeClr val="accent1"/>
+          </a:lnRef>
+          <a:fillRef idx="0">
+            <a:schemeClr val="accent1"/>
+          </a:fillRef>
+          <a:effectRef idx="0">
+            <a:schemeClr val="accent1"/>
+          </a:effectRef>
+          <a:fontRef idx="minor">
+            <a:schemeClr val="tx1"/>
+          </a:fontRef>
+        </p:style>
+      </p:cxnSp>
+      <p:cxnSp>
+        <p:nvCxnSpPr>
+          <p:cNvPr id="56" name="Straight Connector 55">
+            <a:extLst>
+              <a:ext uri="{FF2B5EF4-FFF2-40B4-BE49-F238E27FC236}">
+                <a16:creationId xmlns:a16="http://schemas.microsoft.com/office/drawing/2014/main" id="{72C9415F-F97C-4CB8-8A1E-B1A79EA1010D}"/>
+              </a:ext>
+            </a:extLst>
+          </p:cNvPr>
+          <p:cNvCxnSpPr>
+            <a:cxnSpLocks/>
+          </p:cNvCxnSpPr>
+          <p:nvPr/>
+        </p:nvCxnSpPr>
+        <p:spPr>
+          <a:xfrm flipV="1">
+            <a:off x="3924300" y="3238500"/>
+            <a:ext cx="548640" cy="137160"/>
+          </a:xfrm>
+          <a:prstGeom prst="line">
+            <a:avLst/>
+          </a:prstGeom>
+        </p:spPr>
+        <p:style>
+          <a:lnRef idx="1">
+            <a:schemeClr val="accent1"/>
+          </a:lnRef>
+          <a:fillRef idx="0">
+            <a:schemeClr val="accent1"/>
+          </a:fillRef>
+          <a:effectRef idx="0">
+            <a:schemeClr val="accent1"/>
+          </a:effectRef>
+          <a:fontRef idx="minor">
+            <a:schemeClr val="tx1"/>
+          </a:fontRef>
+        </p:style>
+      </p:cxnSp>
+      <p:cxnSp>
+        <p:nvCxnSpPr>
+          <p:cNvPr id="57" name="Straight Connector 56">
+            <a:extLst>
+              <a:ext uri="{FF2B5EF4-FFF2-40B4-BE49-F238E27FC236}">
+                <a16:creationId xmlns:a16="http://schemas.microsoft.com/office/drawing/2014/main" id="{89175CB4-4E3D-4DA5-BDE0-006EE655913A}"/>
+              </a:ext>
+            </a:extLst>
+          </p:cNvPr>
+          <p:cNvCxnSpPr>
+            <a:cxnSpLocks/>
+          </p:cNvCxnSpPr>
+          <p:nvPr/>
+        </p:nvCxnSpPr>
+        <p:spPr>
+          <a:xfrm flipV="1">
+            <a:off x="4198620" y="3307080"/>
+            <a:ext cx="11429" cy="1907300"/>
+          </a:xfrm>
+          <a:prstGeom prst="line">
+            <a:avLst/>
+          </a:prstGeom>
+        </p:spPr>
+        <p:style>
+          <a:lnRef idx="1">
+            <a:schemeClr val="accent1"/>
+          </a:lnRef>
+          <a:fillRef idx="0">
+            <a:schemeClr val="accent1"/>
+          </a:fillRef>
+          <a:effectRef idx="0">
+            <a:schemeClr val="accent1"/>
+          </a:effectRef>
+          <a:fontRef idx="minor">
+            <a:schemeClr val="tx1"/>
+          </a:fontRef>
+        </p:style>
+      </p:cxnSp>
+      <p:cxnSp>
+        <p:nvCxnSpPr>
+          <p:cNvPr id="60" name="Straight Connector 59">
+            <a:extLst>
+              <a:ext uri="{FF2B5EF4-FFF2-40B4-BE49-F238E27FC236}">
+                <a16:creationId xmlns:a16="http://schemas.microsoft.com/office/drawing/2014/main" id="{6D863379-00A3-42A4-8371-379CE003FDBE}"/>
+              </a:ext>
+            </a:extLst>
+          </p:cNvPr>
+          <p:cNvCxnSpPr>
+            <a:cxnSpLocks/>
+          </p:cNvCxnSpPr>
+          <p:nvPr/>
+        </p:nvCxnSpPr>
+        <p:spPr>
+          <a:xfrm flipV="1">
+            <a:off x="5375908" y="4680651"/>
+            <a:ext cx="0" cy="691449"/>
+          </a:xfrm>
+          <a:prstGeom prst="line">
+            <a:avLst/>
+          </a:prstGeom>
+        </p:spPr>
+        <p:style>
+          <a:lnRef idx="1">
+            <a:schemeClr val="accent1"/>
+          </a:lnRef>
+          <a:fillRef idx="0">
+            <a:schemeClr val="accent1"/>
+          </a:fillRef>
+          <a:effectRef idx="0">
+            <a:schemeClr val="accent1"/>
+          </a:effectRef>
+          <a:fontRef idx="minor">
+            <a:schemeClr val="tx1"/>
+          </a:fontRef>
+        </p:style>
+      </p:cxnSp>
+      <p:cxnSp>
+        <p:nvCxnSpPr>
+          <p:cNvPr id="63" name="Straight Connector 62">
+            <a:extLst>
+              <a:ext uri="{FF2B5EF4-FFF2-40B4-BE49-F238E27FC236}">
+                <a16:creationId xmlns:a16="http://schemas.microsoft.com/office/drawing/2014/main" id="{EC35BE67-37ED-47C8-BECC-8B1C5F265AB6}"/>
+              </a:ext>
+            </a:extLst>
+          </p:cNvPr>
+          <p:cNvCxnSpPr>
+            <a:cxnSpLocks/>
+          </p:cNvCxnSpPr>
+          <p:nvPr/>
+        </p:nvCxnSpPr>
+        <p:spPr>
+          <a:xfrm flipV="1">
+            <a:off x="6059804" y="4838700"/>
+            <a:ext cx="0" cy="990601"/>
+          </a:xfrm>
+          <a:prstGeom prst="line">
+            <a:avLst/>
+          </a:prstGeom>
+        </p:spPr>
+        <p:style>
+          <a:lnRef idx="1">
+            <a:schemeClr val="accent1"/>
+          </a:lnRef>
+          <a:fillRef idx="0">
+            <a:schemeClr val="accent1"/>
+          </a:fillRef>
+          <a:effectRef idx="0">
+            <a:schemeClr val="accent1"/>
+          </a:effectRef>
+          <a:fontRef idx="minor">
+            <a:schemeClr val="tx1"/>
+          </a:fontRef>
+        </p:style>
+      </p:cxnSp>
+      <p:cxnSp>
+        <p:nvCxnSpPr>
+          <p:cNvPr id="64" name="Straight Connector 63">
+            <a:extLst>
+              <a:ext uri="{FF2B5EF4-FFF2-40B4-BE49-F238E27FC236}">
+                <a16:creationId xmlns:a16="http://schemas.microsoft.com/office/drawing/2014/main" id="{6AEE6C88-F112-4999-912C-06F80872A4E3}"/>
+              </a:ext>
+            </a:extLst>
+          </p:cNvPr>
+          <p:cNvCxnSpPr>
+            <a:cxnSpLocks/>
+          </p:cNvCxnSpPr>
+          <p:nvPr/>
+        </p:nvCxnSpPr>
+        <p:spPr>
+          <a:xfrm flipV="1">
+            <a:off x="6743700" y="5518851"/>
+            <a:ext cx="0" cy="691449"/>
+          </a:xfrm>
+          <a:prstGeom prst="line">
+            <a:avLst/>
+          </a:prstGeom>
+        </p:spPr>
+        <p:style>
+          <a:lnRef idx="1">
+            <a:schemeClr val="accent1"/>
+          </a:lnRef>
+          <a:fillRef idx="0">
+            <a:schemeClr val="accent1"/>
+          </a:fillRef>
+          <a:effectRef idx="0">
+            <a:schemeClr val="accent1"/>
+          </a:effectRef>
+          <a:fontRef idx="minor">
+            <a:schemeClr val="tx1"/>
+          </a:fontRef>
+        </p:style>
+      </p:cxnSp>
+      <p:cxnSp>
+        <p:nvCxnSpPr>
+          <p:cNvPr id="70" name="Straight Connector 69">
+            <a:extLst>
+              <a:ext uri="{FF2B5EF4-FFF2-40B4-BE49-F238E27FC236}">
+                <a16:creationId xmlns:a16="http://schemas.microsoft.com/office/drawing/2014/main" id="{F9B55D04-C209-4AFF-A054-7200852532FD}"/>
+              </a:ext>
+            </a:extLst>
+          </p:cNvPr>
+          <p:cNvCxnSpPr>
+            <a:cxnSpLocks/>
+          </p:cNvCxnSpPr>
+          <p:nvPr/>
+        </p:nvCxnSpPr>
+        <p:spPr>
+          <a:xfrm>
+            <a:off x="5372100" y="5143500"/>
+            <a:ext cx="1371600" cy="835611"/>
+          </a:xfrm>
+          <a:prstGeom prst="line">
+            <a:avLst/>
+          </a:prstGeom>
+          <a:ln>
+            <a:headEnd type="none" w="med" len="med"/>
+            <a:tailEnd type="none" w="med" len="med"/>
+          </a:ln>
+        </p:spPr>
+        <p:style>
+          <a:lnRef idx="1">
+            <a:schemeClr val="accent1"/>
+          </a:lnRef>
+          <a:fillRef idx="0">
+            <a:schemeClr val="accent1"/>
+          </a:fillRef>
+          <a:effectRef idx="0">
+            <a:schemeClr val="accent1"/>
+          </a:effectRef>
+          <a:fontRef idx="minor">
+            <a:schemeClr val="tx1"/>
+          </a:fontRef>
+        </p:style>
+      </p:cxnSp>
+      <p:sp>
+        <p:nvSpPr>
+          <p:cNvPr id="74" name="TextBox 73">
+            <a:extLst>
+              <a:ext uri="{FF2B5EF4-FFF2-40B4-BE49-F238E27FC236}">
+                <a16:creationId xmlns:a16="http://schemas.microsoft.com/office/drawing/2014/main" id="{B77B5F75-2910-41A1-9A39-4F764BEF1A5A}"/>
+              </a:ext>
+            </a:extLst>
+          </p:cNvPr>
+          <p:cNvSpPr txBox="1"/>
+          <p:nvPr/>
+        </p:nvSpPr>
+        <p:spPr>
+          <a:xfrm>
+            <a:off x="5564096" y="2208650"/>
+            <a:ext cx="797107" cy="369332"/>
+          </a:xfrm>
+          <a:prstGeom prst="rect">
+            <a:avLst/>
+          </a:prstGeom>
+          <a:solidFill>
+            <a:schemeClr val="bg1"/>
+          </a:solidFill>
+        </p:spPr>
+        <p:txBody>
+          <a:bodyPr wrap="square" rtlCol="0">
+            <a:spAutoFit/>
+          </a:bodyPr>
+          <a:lstStyle/>
+          <a:p>
+            <a:pPr algn="ctr"/>
+            <a:r>
+              <a:rPr lang="en-US" dirty="0">
+                <a:solidFill>
+                  <a:srgbClr val="0070C0"/>
+                </a:solidFill>
+              </a:rPr>
+              <a:t>4 m</a:t>
+            </a:r>
+          </a:p>
+        </p:txBody>
+      </p:sp>
+      <p:sp>
+        <p:nvSpPr>
+          <p:cNvPr id="75" name="TextBox 74">
+            <a:extLst>
+              <a:ext uri="{FF2B5EF4-FFF2-40B4-BE49-F238E27FC236}">
+                <a16:creationId xmlns:a16="http://schemas.microsoft.com/office/drawing/2014/main" id="{24521262-1196-467B-8F58-C9818C737409}"/>
+              </a:ext>
+            </a:extLst>
+          </p:cNvPr>
+          <p:cNvSpPr txBox="1"/>
+          <p:nvPr/>
+        </p:nvSpPr>
+        <p:spPr>
+          <a:xfrm>
+            <a:off x="3810000" y="4088368"/>
+            <a:ext cx="797107" cy="369332"/>
+          </a:xfrm>
+          <a:prstGeom prst="rect">
+            <a:avLst/>
+          </a:prstGeom>
+          <a:solidFill>
+            <a:schemeClr val="bg1"/>
+          </a:solidFill>
+        </p:spPr>
+        <p:txBody>
+          <a:bodyPr wrap="square" rtlCol="0">
+            <a:spAutoFit/>
+          </a:bodyPr>
+          <a:lstStyle/>
+          <a:p>
+            <a:pPr algn="ctr"/>
+            <a:r>
+              <a:rPr lang="en-US" dirty="0">
+                <a:solidFill>
+                  <a:srgbClr val="0070C0"/>
+                </a:solidFill>
+              </a:rPr>
+              <a:t>4 m</a:t>
+            </a:r>
+          </a:p>
+        </p:txBody>
+      </p:sp>
+      <p:sp>
+        <p:nvSpPr>
+          <p:cNvPr id="76" name="TextBox 75">
+            <a:extLst>
+              <a:ext uri="{FF2B5EF4-FFF2-40B4-BE49-F238E27FC236}">
+                <a16:creationId xmlns:a16="http://schemas.microsoft.com/office/drawing/2014/main" id="{4A733171-0AE5-4EFF-AF6C-F7EB318E727D}"/>
+              </a:ext>
+            </a:extLst>
+          </p:cNvPr>
+          <p:cNvSpPr txBox="1"/>
+          <p:nvPr/>
+        </p:nvSpPr>
+        <p:spPr>
+          <a:xfrm>
+            <a:off x="5461634" y="5175664"/>
+            <a:ext cx="533400" cy="338554"/>
+          </a:xfrm>
+          <a:prstGeom prst="rect">
+            <a:avLst/>
+          </a:prstGeom>
+          <a:solidFill>
+            <a:schemeClr val="bg1"/>
+          </a:solidFill>
+        </p:spPr>
+        <p:txBody>
+          <a:bodyPr wrap="square" rtlCol="0">
+            <a:spAutoFit/>
+          </a:bodyPr>
+          <a:lstStyle/>
+          <a:p>
+            <a:pPr algn="ctr"/>
+            <a:r>
+              <a:rPr lang="en-US" sz="1600" dirty="0">
+                <a:solidFill>
+                  <a:srgbClr val="0070C0"/>
+                </a:solidFill>
+              </a:rPr>
+              <a:t>2 m</a:t>
+            </a:r>
+          </a:p>
+        </p:txBody>
+      </p:sp>
+      <p:sp>
+        <p:nvSpPr>
+          <p:cNvPr id="77" name="TextBox 76">
+            <a:extLst>
+              <a:ext uri="{FF2B5EF4-FFF2-40B4-BE49-F238E27FC236}">
+                <a16:creationId xmlns:a16="http://schemas.microsoft.com/office/drawing/2014/main" id="{05AF04F9-4979-4ACF-B7F7-3497CFF80D87}"/>
+              </a:ext>
+            </a:extLst>
+          </p:cNvPr>
+          <p:cNvSpPr txBox="1"/>
+          <p:nvPr/>
+        </p:nvSpPr>
+        <p:spPr>
+          <a:xfrm>
+            <a:off x="6124575" y="5613986"/>
+            <a:ext cx="533400" cy="338554"/>
+          </a:xfrm>
+          <a:prstGeom prst="rect">
+            <a:avLst/>
+          </a:prstGeom>
+          <a:solidFill>
+            <a:schemeClr val="bg1"/>
+          </a:solidFill>
+        </p:spPr>
+        <p:txBody>
+          <a:bodyPr wrap="square" rtlCol="0">
+            <a:spAutoFit/>
+          </a:bodyPr>
+          <a:lstStyle/>
+          <a:p>
+            <a:pPr algn="ctr"/>
+            <a:r>
+              <a:rPr lang="en-US" sz="1600" dirty="0">
+                <a:solidFill>
+                  <a:srgbClr val="0070C0"/>
+                </a:solidFill>
+              </a:rPr>
+              <a:t>2 m</a:t>
+            </a:r>
+          </a:p>
+        </p:txBody>
+      </p:sp>
+      <p:sp>
+        <p:nvSpPr>
+          <p:cNvPr id="78" name="TextBox 77">
+            <a:extLst>
+              <a:ext uri="{FF2B5EF4-FFF2-40B4-BE49-F238E27FC236}">
+                <a16:creationId xmlns:a16="http://schemas.microsoft.com/office/drawing/2014/main" id="{84790D79-AE33-437A-9861-E67F93648ABC}"/>
+              </a:ext>
+            </a:extLst>
+          </p:cNvPr>
+          <p:cNvSpPr txBox="1"/>
+          <p:nvPr/>
+        </p:nvSpPr>
+        <p:spPr>
+          <a:xfrm>
+            <a:off x="4298841" y="2697480"/>
+            <a:ext cx="317716" cy="369332"/>
+          </a:xfrm>
+          <a:prstGeom prst="rect">
+            <a:avLst/>
+          </a:prstGeom>
+          <a:noFill/>
+        </p:spPr>
+        <p:txBody>
+          <a:bodyPr wrap="none" rtlCol="0">
+            <a:spAutoFit/>
+          </a:bodyPr>
+          <a:lstStyle/>
+          <a:p>
+            <a:r>
+              <a:rPr lang="en-US" dirty="0"/>
+              <a:t>A</a:t>
+            </a:r>
+          </a:p>
+        </p:txBody>
+      </p:sp>
+      <p:sp>
+        <p:nvSpPr>
+          <p:cNvPr id="79" name="TextBox 78">
+            <a:extLst>
+              <a:ext uri="{FF2B5EF4-FFF2-40B4-BE49-F238E27FC236}">
+                <a16:creationId xmlns:a16="http://schemas.microsoft.com/office/drawing/2014/main" id="{BEC5772E-4449-4139-9459-EC45DD8B0A33}"/>
+              </a:ext>
+            </a:extLst>
+          </p:cNvPr>
+          <p:cNvSpPr txBox="1"/>
+          <p:nvPr/>
+        </p:nvSpPr>
+        <p:spPr>
+          <a:xfrm>
+            <a:off x="7412779" y="2059918"/>
+            <a:ext cx="309700" cy="369332"/>
+          </a:xfrm>
+          <a:prstGeom prst="rect">
+            <a:avLst/>
+          </a:prstGeom>
+          <a:noFill/>
+        </p:spPr>
+        <p:txBody>
+          <a:bodyPr wrap="none" rtlCol="0">
+            <a:spAutoFit/>
+          </a:bodyPr>
+          <a:lstStyle/>
+          <a:p>
+            <a:r>
+              <a:rPr lang="en-US" dirty="0"/>
+              <a:t>B</a:t>
+            </a:r>
+          </a:p>
+        </p:txBody>
+      </p:sp>
+      <p:sp>
+        <p:nvSpPr>
+          <p:cNvPr id="80" name="TextBox 79">
+            <a:extLst>
+              <a:ext uri="{FF2B5EF4-FFF2-40B4-BE49-F238E27FC236}">
+                <a16:creationId xmlns:a16="http://schemas.microsoft.com/office/drawing/2014/main" id="{59E2C8D7-48D1-4E50-83A9-290824951D61}"/>
+              </a:ext>
+            </a:extLst>
+          </p:cNvPr>
+          <p:cNvSpPr txBox="1"/>
+          <p:nvPr/>
+        </p:nvSpPr>
+        <p:spPr>
+          <a:xfrm>
+            <a:off x="4957234" y="4032583"/>
+            <a:ext cx="308098" cy="369332"/>
+          </a:xfrm>
+          <a:prstGeom prst="rect">
+            <a:avLst/>
+          </a:prstGeom>
+          <a:noFill/>
+        </p:spPr>
+        <p:txBody>
+          <a:bodyPr wrap="none" rtlCol="0">
+            <a:spAutoFit/>
+          </a:bodyPr>
+          <a:lstStyle/>
+          <a:p>
+            <a:r>
+              <a:rPr lang="en-US" dirty="0"/>
+              <a:t>C</a:t>
+            </a:r>
+          </a:p>
+        </p:txBody>
+      </p:sp>
+      <p:sp>
+        <p:nvSpPr>
+          <p:cNvPr id="81" name="TextBox 80">
+            <a:extLst>
+              <a:ext uri="{FF2B5EF4-FFF2-40B4-BE49-F238E27FC236}">
+                <a16:creationId xmlns:a16="http://schemas.microsoft.com/office/drawing/2014/main" id="{56489C1D-1D5E-4076-A05E-844652F44E26}"/>
+              </a:ext>
+            </a:extLst>
+          </p:cNvPr>
+          <p:cNvSpPr txBox="1"/>
+          <p:nvPr/>
+        </p:nvSpPr>
+        <p:spPr>
+          <a:xfrm>
+            <a:off x="6890599" y="4908431"/>
+            <a:ext cx="327334" cy="369332"/>
+          </a:xfrm>
+          <a:prstGeom prst="rect">
+            <a:avLst/>
+          </a:prstGeom>
+          <a:noFill/>
+        </p:spPr>
+        <p:txBody>
+          <a:bodyPr wrap="none" rtlCol="0">
+            <a:spAutoFit/>
+          </a:bodyPr>
+          <a:lstStyle/>
+          <a:p>
+            <a:r>
+              <a:rPr lang="en-US" dirty="0"/>
+              <a:t>D</a:t>
+            </a:r>
+          </a:p>
+        </p:txBody>
+      </p:sp>
+      <p:sp>
+        <p:nvSpPr>
+          <p:cNvPr id="82" name="TextBox 81">
+            <a:extLst>
+              <a:ext uri="{FF2B5EF4-FFF2-40B4-BE49-F238E27FC236}">
+                <a16:creationId xmlns:a16="http://schemas.microsoft.com/office/drawing/2014/main" id="{396FD2A9-2668-4599-98F0-C87B02FCB0F7}"/>
+              </a:ext>
+            </a:extLst>
+          </p:cNvPr>
+          <p:cNvSpPr txBox="1"/>
+          <p:nvPr/>
+        </p:nvSpPr>
+        <p:spPr>
+          <a:xfrm>
+            <a:off x="4242044" y="4752926"/>
+            <a:ext cx="296876" cy="369332"/>
+          </a:xfrm>
+          <a:prstGeom prst="rect">
+            <a:avLst/>
+          </a:prstGeom>
+          <a:noFill/>
+        </p:spPr>
+        <p:txBody>
+          <a:bodyPr wrap="none" rtlCol="0">
+            <a:spAutoFit/>
+          </a:bodyPr>
+          <a:lstStyle/>
+          <a:p>
+            <a:r>
+              <a:rPr lang="en-US" dirty="0"/>
+              <a:t>E</a:t>
+            </a:r>
+          </a:p>
+        </p:txBody>
+      </p:sp>
+      <p:sp>
+        <p:nvSpPr>
+          <p:cNvPr id="83" name="TextBox 82">
+            <a:extLst>
+              <a:ext uri="{FF2B5EF4-FFF2-40B4-BE49-F238E27FC236}">
+                <a16:creationId xmlns:a16="http://schemas.microsoft.com/office/drawing/2014/main" id="{50780F2E-AB16-4E86-A27F-6DA70AD6743D}"/>
+              </a:ext>
+            </a:extLst>
+          </p:cNvPr>
+          <p:cNvSpPr txBox="1"/>
+          <p:nvPr/>
+        </p:nvSpPr>
+        <p:spPr>
+          <a:xfrm>
+            <a:off x="7496175" y="5463589"/>
+            <a:ext cx="284052" cy="369332"/>
+          </a:xfrm>
+          <a:prstGeom prst="rect">
+            <a:avLst/>
+          </a:prstGeom>
+          <a:noFill/>
+        </p:spPr>
+        <p:txBody>
+          <a:bodyPr wrap="none" rtlCol="0">
+            <a:spAutoFit/>
+          </a:bodyPr>
+          <a:lstStyle/>
+          <a:p>
+            <a:r>
+              <a:rPr lang="en-US" dirty="0"/>
+              <a:t>x</a:t>
+            </a:r>
+          </a:p>
+        </p:txBody>
+      </p:sp>
+      <p:sp>
+        <p:nvSpPr>
+          <p:cNvPr id="84" name="TextBox 83">
+            <a:extLst>
+              <a:ext uri="{FF2B5EF4-FFF2-40B4-BE49-F238E27FC236}">
+                <a16:creationId xmlns:a16="http://schemas.microsoft.com/office/drawing/2014/main" id="{C3F994F3-D3C0-4A0A-813A-65C214F8B9BD}"/>
+              </a:ext>
+            </a:extLst>
+          </p:cNvPr>
+          <p:cNvSpPr txBox="1"/>
+          <p:nvPr/>
+        </p:nvSpPr>
+        <p:spPr>
+          <a:xfrm>
+            <a:off x="8373132" y="3945493"/>
+            <a:ext cx="288862" cy="369332"/>
+          </a:xfrm>
+          <a:prstGeom prst="rect">
+            <a:avLst/>
+          </a:prstGeom>
+          <a:noFill/>
+        </p:spPr>
+        <p:txBody>
+          <a:bodyPr wrap="none" rtlCol="0">
+            <a:spAutoFit/>
+          </a:bodyPr>
+          <a:lstStyle/>
+          <a:p>
+            <a:r>
+              <a:rPr lang="en-US" dirty="0"/>
+              <a:t>y</a:t>
+            </a:r>
+          </a:p>
+        </p:txBody>
+      </p:sp>
+      <p:sp>
+        <p:nvSpPr>
+          <p:cNvPr id="85" name="TextBox 84">
+            <a:extLst>
+              <a:ext uri="{FF2B5EF4-FFF2-40B4-BE49-F238E27FC236}">
+                <a16:creationId xmlns:a16="http://schemas.microsoft.com/office/drawing/2014/main" id="{A131B25B-D80A-4262-8FB2-08ACFD966851}"/>
+              </a:ext>
+            </a:extLst>
+          </p:cNvPr>
+          <p:cNvSpPr txBox="1"/>
+          <p:nvPr/>
+        </p:nvSpPr>
+        <p:spPr>
+          <a:xfrm>
+            <a:off x="4559014" y="1775056"/>
+            <a:ext cx="276038" cy="369332"/>
+          </a:xfrm>
+          <a:prstGeom prst="rect">
+            <a:avLst/>
+          </a:prstGeom>
+          <a:noFill/>
+        </p:spPr>
+        <p:txBody>
+          <a:bodyPr wrap="none" rtlCol="0">
+            <a:spAutoFit/>
+          </a:bodyPr>
+          <a:lstStyle/>
+          <a:p>
+            <a:r>
+              <a:rPr lang="en-US" dirty="0"/>
+              <a:t>z</a:t>
+            </a:r>
+          </a:p>
+        </p:txBody>
+      </p:sp>
+    </p:spTree>
+    <p:extLst>
+      <p:ext uri="{BB962C8B-B14F-4D97-AF65-F5344CB8AC3E}">
+        <p14:creationId xmlns:p14="http://schemas.microsoft.com/office/powerpoint/2010/main" val="3049271909"/>
       </p:ext>
     </p:extLst>
   </p:cSld>
@@ -17939,6 +21750,21 @@
 </file>
 
 <file path=customXml/item1.xml><?xml version="1.0" encoding="utf-8"?>
+<p:properties xmlns:p="http://schemas.microsoft.com/office/2006/metadata/properties" xmlns:xsi="http://www.w3.org/2001/XMLSchema-instance" xmlns:pc="http://schemas.microsoft.com/office/infopath/2007/PartnerControls">
+  <documentManagement/>
+</p:properties>
+</file>
+
+<file path=customXml/item2.xml><?xml version="1.0" encoding="utf-8"?>
+<?mso-contentType ?>
+<FormTemplates xmlns="http://schemas.microsoft.com/sharepoint/v3/contenttype/forms">
+  <Display>DocumentLibraryForm</Display>
+  <Edit>DocumentLibraryForm</Edit>
+  <New>DocumentLibraryForm</New>
+</FormTemplates>
+</file>
+
+<file path=customXml/item3.xml><?xml version="1.0" encoding="utf-8"?>
 <ct:contentTypeSchema xmlns:ct="http://schemas.microsoft.com/office/2006/metadata/contentType" xmlns:ma="http://schemas.microsoft.com/office/2006/metadata/properties/metaAttributes" ct:_="" ma:_="" ma:contentTypeName="Document" ma:contentTypeID="0x010100A06DF21F5BB2734A800ED30F3F452129" ma:contentTypeVersion="12" ma:contentTypeDescription="Create a new document." ma:contentTypeScope="" ma:versionID="544d96a5fbac5de9d5d902b535c73fb2">
   <xsd:schema xmlns:xsd="http://www.w3.org/2001/XMLSchema" xmlns:xs="http://www.w3.org/2001/XMLSchema" xmlns:p="http://schemas.microsoft.com/office/2006/metadata/properties" xmlns:ns3="90d05cb5-950f-4f68-bc2c-e17794455b92" xmlns:ns4="b4eab9fa-dbb0-4082-8491-8bd54207a265" targetNamespace="http://schemas.microsoft.com/office/2006/metadata/properties" ma:root="true" ma:fieldsID="7a710efc71c2169bf9c05e5a40dddf12" ns3:_="" ns4:_="">
     <xsd:import namespace="90d05cb5-950f-4f68-bc2c-e17794455b92"/>
@@ -18155,22 +21981,24 @@
 </ct:contentTypeSchema>
 </file>
 
-<file path=customXml/item2.xml><?xml version="1.0" encoding="utf-8"?>
-<?mso-contentType ?>
-<FormTemplates xmlns="http://schemas.microsoft.com/sharepoint/v3/contenttype/forms">
-  <Display>DocumentLibraryForm</Display>
-  <Edit>DocumentLibraryForm</Edit>
-  <New>DocumentLibraryForm</New>
-</FormTemplates>
+<file path=customXml/itemProps1.xml><?xml version="1.0" encoding="utf-8"?>
+<ds:datastoreItem xmlns:ds="http://schemas.openxmlformats.org/officeDocument/2006/customXml" ds:itemID="{52EB1464-66D1-425A-BBB5-7A9312BBE9C4}">
+  <ds:schemaRefs>
+    <ds:schemaRef ds:uri="http://schemas.microsoft.com/office/2006/metadata/properties"/>
+    <ds:schemaRef ds:uri="http://schemas.microsoft.com/office/infopath/2007/PartnerControls"/>
+  </ds:schemaRefs>
+</ds:datastoreItem>
 </file>
 
-<file path=customXml/item3.xml><?xml version="1.0" encoding="utf-8"?>
-<p:properties xmlns:p="http://schemas.microsoft.com/office/2006/metadata/properties" xmlns:xsi="http://www.w3.org/2001/XMLSchema-instance" xmlns:pc="http://schemas.microsoft.com/office/infopath/2007/PartnerControls">
-  <documentManagement/>
-</p:properties>
+<file path=customXml/itemProps2.xml><?xml version="1.0" encoding="utf-8"?>
+<ds:datastoreItem xmlns:ds="http://schemas.openxmlformats.org/officeDocument/2006/customXml" ds:itemID="{F5CF5F32-56DC-4068-8B04-457CF34A96F3}">
+  <ds:schemaRefs>
+    <ds:schemaRef ds:uri="http://schemas.microsoft.com/sharepoint/v3/contenttype/forms"/>
+  </ds:schemaRefs>
+</ds:datastoreItem>
 </file>
 
-<file path=customXml/itemProps1.xml><?xml version="1.0" encoding="utf-8"?>
+<file path=customXml/itemProps3.xml><?xml version="1.0" encoding="utf-8"?>
 <ds:datastoreItem xmlns:ds="http://schemas.openxmlformats.org/officeDocument/2006/customXml" ds:itemID="{A43B8A4B-79FE-4529-931C-D64224FA70E3}">
   <ds:schemaRefs>
     <ds:schemaRef ds:uri="http://schemas.microsoft.com/office/2006/metadata/contentType"/>
@@ -18187,21 +22015,4 @@
     <ds:schemaRef ds:uri="http://schemas.microsoft.com/internal/obd"/>
   </ds:schemaRefs>
 </ds:datastoreItem>
-</file>
-
-<file path=customXml/itemProps2.xml><?xml version="1.0" encoding="utf-8"?>
-<ds:datastoreItem xmlns:ds="http://schemas.openxmlformats.org/officeDocument/2006/customXml" ds:itemID="{F5CF5F32-56DC-4068-8B04-457CF34A96F3}">
-  <ds:schemaRefs>
-    <ds:schemaRef ds:uri="http://schemas.microsoft.com/sharepoint/v3/contenttype/forms"/>
-  </ds:schemaRefs>
-</ds:datastoreItem>
-</file>
-
-<file path=customXml/itemProps3.xml><?xml version="1.0" encoding="utf-8"?>
-<ds:datastoreItem xmlns:ds="http://schemas.openxmlformats.org/officeDocument/2006/customXml" ds:itemID="{52EB1464-66D1-425A-BBB5-7A9312BBE9C4}">
-  <ds:schemaRefs>
-    <ds:schemaRef ds:uri="http://schemas.microsoft.com/office/2006/metadata/properties"/>
-    <ds:schemaRef ds:uri="http://schemas.microsoft.com/office/infopath/2007/PartnerControls"/>
-  </ds:schemaRefs>
-</ds:datastoreItem>
 </file>
</xml_diff>